<commit_message>
Modify DeveloperGuide.md diagram for storage
</commit_message>
<xml_diff>
--- a/docs/diagrams/StorageComponentClassDiagram.pptx
+++ b/docs/diagrams/StorageComponentClassDiagram.pptx
@@ -107,6 +107,22 @@
       </a:defRPr>
     </a:lvl9pPr>
   </p:defaultTextStyle>
+  <p:extLst>
+    <p:ext uri="{EFAFB233-063F-42B5-8137-9DF3F51BA10A}">
+      <p15:sldGuideLst xmlns:p15="http://schemas.microsoft.com/office/powerpoint/2012/main">
+        <p15:guide id="1" orient="horz" pos="1488">
+          <p15:clr>
+            <a:srgbClr val="A4A3A4"/>
+          </p15:clr>
+        </p15:guide>
+        <p15:guide id="2" pos="2880">
+          <p15:clr>
+            <a:srgbClr val="A4A3A4"/>
+          </p15:clr>
+        </p15:guide>
+      </p15:sldGuideLst>
+    </p:ext>
+  </p:extLst>
 </p:presentation>
 </file>
 
@@ -192,7 +208,7 @@
           <a:p>
             <a:fld id="{F5CC4B3F-88C1-4FFA-B1B6-F41C21DC6924}" type="datetimeFigureOut">
               <a:rPr lang="en-US" smtClean="0"/>
-              <a:t>10/16/2016</a:t>
+              <a:t>3/10/17</a:t>
             </a:fld>
             <a:endParaRPr lang="en-US"/>
           </a:p>
@@ -641,7 +657,7 @@
           <a:p>
             <a:fld id="{78C97017-6FC3-485B-9764-EAC9E56C1D49}" type="datetimeFigureOut">
               <a:rPr lang="en-US" smtClean="0"/>
-              <a:t>10/16/2016</a:t>
+              <a:t>3/10/17</a:t>
             </a:fld>
             <a:endParaRPr lang="en-US"/>
           </a:p>
@@ -811,7 +827,7 @@
           <a:p>
             <a:fld id="{78C97017-6FC3-485B-9764-EAC9E56C1D49}" type="datetimeFigureOut">
               <a:rPr lang="en-US" smtClean="0"/>
-              <a:t>10/16/2016</a:t>
+              <a:t>3/10/17</a:t>
             </a:fld>
             <a:endParaRPr lang="en-US"/>
           </a:p>
@@ -991,7 +1007,7 @@
           <a:p>
             <a:fld id="{78C97017-6FC3-485B-9764-EAC9E56C1D49}" type="datetimeFigureOut">
               <a:rPr lang="en-US" smtClean="0"/>
-              <a:t>10/16/2016</a:t>
+              <a:t>3/10/17</a:t>
             </a:fld>
             <a:endParaRPr lang="en-US"/>
           </a:p>
@@ -1161,7 +1177,7 @@
           <a:p>
             <a:fld id="{78C97017-6FC3-485B-9764-EAC9E56C1D49}" type="datetimeFigureOut">
               <a:rPr lang="en-US" smtClean="0"/>
-              <a:t>10/16/2016</a:t>
+              <a:t>3/10/17</a:t>
             </a:fld>
             <a:endParaRPr lang="en-US"/>
           </a:p>
@@ -1407,7 +1423,7 @@
           <a:p>
             <a:fld id="{78C97017-6FC3-485B-9764-EAC9E56C1D49}" type="datetimeFigureOut">
               <a:rPr lang="en-US" smtClean="0"/>
-              <a:t>10/16/2016</a:t>
+              <a:t>3/10/17</a:t>
             </a:fld>
             <a:endParaRPr lang="en-US"/>
           </a:p>
@@ -1695,7 +1711,7 @@
           <a:p>
             <a:fld id="{78C97017-6FC3-485B-9764-EAC9E56C1D49}" type="datetimeFigureOut">
               <a:rPr lang="en-US" smtClean="0"/>
-              <a:t>10/16/2016</a:t>
+              <a:t>3/10/17</a:t>
             </a:fld>
             <a:endParaRPr lang="en-US"/>
           </a:p>
@@ -2117,7 +2133,7 @@
           <a:p>
             <a:fld id="{78C97017-6FC3-485B-9764-EAC9E56C1D49}" type="datetimeFigureOut">
               <a:rPr lang="en-US" smtClean="0"/>
-              <a:t>10/16/2016</a:t>
+              <a:t>3/10/17</a:t>
             </a:fld>
             <a:endParaRPr lang="en-US"/>
           </a:p>
@@ -2235,7 +2251,7 @@
           <a:p>
             <a:fld id="{78C97017-6FC3-485B-9764-EAC9E56C1D49}" type="datetimeFigureOut">
               <a:rPr lang="en-US" smtClean="0"/>
-              <a:t>10/16/2016</a:t>
+              <a:t>3/10/17</a:t>
             </a:fld>
             <a:endParaRPr lang="en-US"/>
           </a:p>
@@ -2330,7 +2346,7 @@
           <a:p>
             <a:fld id="{78C97017-6FC3-485B-9764-EAC9E56C1D49}" type="datetimeFigureOut">
               <a:rPr lang="en-US" smtClean="0"/>
-              <a:t>10/16/2016</a:t>
+              <a:t>3/10/17</a:t>
             </a:fld>
             <a:endParaRPr lang="en-US"/>
           </a:p>
@@ -2607,7 +2623,7 @@
           <a:p>
             <a:fld id="{78C97017-6FC3-485B-9764-EAC9E56C1D49}" type="datetimeFigureOut">
               <a:rPr lang="en-US" smtClean="0"/>
-              <a:t>10/16/2016</a:t>
+              <a:t>3/10/17</a:t>
             </a:fld>
             <a:endParaRPr lang="en-US"/>
           </a:p>
@@ -2860,7 +2876,7 @@
           <a:p>
             <a:fld id="{78C97017-6FC3-485B-9764-EAC9E56C1D49}" type="datetimeFigureOut">
               <a:rPr lang="en-US" smtClean="0"/>
-              <a:t>10/16/2016</a:t>
+              <a:t>3/10/17</a:t>
             </a:fld>
             <a:endParaRPr lang="en-US"/>
           </a:p>
@@ -3073,7 +3089,7 @@
           <a:p>
             <a:fld id="{78C97017-6FC3-485B-9764-EAC9E56C1D49}" type="datetimeFigureOut">
               <a:rPr lang="en-US" smtClean="0"/>
-              <a:t>10/16/2016</a:t>
+              <a:t>3/10/17</a:t>
             </a:fld>
             <a:endParaRPr lang="en-US"/>
           </a:p>
@@ -3521,8 +3537,8 @@
         </p:nvSpPr>
         <p:spPr>
           <a:xfrm>
-            <a:off x="2877180" y="3158440"/>
-            <a:ext cx="1323049" cy="346760"/>
+            <a:off x="2850272" y="3158440"/>
+            <a:ext cx="1349958" cy="346760"/>
           </a:xfrm>
           <a:prstGeom prst="rect">
             <a:avLst/>
@@ -3581,7 +3597,7 @@
                   <a:schemeClr val="bg1"/>
                 </a:solidFill>
               </a:rPr>
-              <a:t>AddressBookStorage</a:t>
+              <a:t>TaskManagerStorage</a:t>
             </a:r>
             <a:endParaRPr lang="en-SG" sz="1050" dirty="0">
               <a:solidFill>
@@ -3599,7 +3615,7 @@
         </p:nvSpPr>
         <p:spPr>
           <a:xfrm rot="16200000">
-            <a:off x="1683963" y="2868687"/>
+            <a:off x="1612072" y="2868687"/>
             <a:ext cx="1093635" cy="346760"/>
           </a:xfrm>
           <a:prstGeom prst="rect">
@@ -3662,7 +3678,7 @@
         </p:nvSpPr>
         <p:spPr>
           <a:xfrm rot="16200000">
-            <a:off x="956202" y="2861202"/>
+            <a:off x="884311" y="2861202"/>
             <a:ext cx="1093635" cy="346760"/>
           </a:xfrm>
           <a:prstGeom prst="rect">
@@ -3736,7 +3752,7 @@
         </p:nvSpPr>
         <p:spPr>
           <a:xfrm rot="16200000">
-            <a:off x="1626910" y="2952291"/>
+            <a:off x="1555019" y="2952291"/>
             <a:ext cx="270504" cy="175523"/>
           </a:xfrm>
           <a:prstGeom prst="triangle">
@@ -3786,15 +3802,12 @@
       <p:cxnSp>
         <p:nvCxnSpPr>
           <p:cNvPr id="58" name="Straight Arrow Connector 57"/>
-          <p:cNvCxnSpPr>
-            <a:stCxn id="42" idx="3"/>
-            <a:endCxn id="2" idx="1"/>
-          </p:cNvCxnSpPr>
+          <p:cNvCxnSpPr/>
           <p:nvPr/>
         </p:nvCxnSpPr>
         <p:spPr>
           <a:xfrm>
-            <a:off x="2656370" y="3326536"/>
+            <a:off x="2590800" y="3326536"/>
             <a:ext cx="220810" cy="5284"/>
           </a:xfrm>
           <a:prstGeom prst="straightConnector1">
@@ -3834,7 +3847,7 @@
         </p:nvCxnSpPr>
         <p:spPr>
           <a:xfrm>
-            <a:off x="910091" y="3040053"/>
+            <a:off x="838200" y="3040053"/>
             <a:ext cx="419548" cy="2860"/>
           </a:xfrm>
           <a:prstGeom prst="bentConnector3">
@@ -3879,7 +3892,7 @@
         </p:nvCxnSpPr>
         <p:spPr>
           <a:xfrm flipV="1">
-            <a:off x="1849924" y="3040052"/>
+            <a:off x="1778033" y="3040052"/>
             <a:ext cx="216105" cy="1"/>
           </a:xfrm>
           <a:prstGeom prst="line">
@@ -3920,7 +3933,7 @@
         </p:nvSpPr>
         <p:spPr>
           <a:xfrm>
-            <a:off x="2420322" y="3239846"/>
+            <a:off x="2362542" y="3239846"/>
             <a:ext cx="236048" cy="173380"/>
           </a:xfrm>
           <a:prstGeom prst="flowChartDecision">
@@ -4154,7 +4167,7 @@
                   </a:schemeClr>
                 </a:solidFill>
               </a:rPr>
-              <a:t>XmlAddressBook</a:t>
+              <a:t>XmlTaskManager</a:t>
             </a:r>
             <a:r>
               <a:rPr lang="en-US" sz="1050" b="1" dirty="0" smtClean="0">
@@ -4203,8 +4216,8 @@
         </p:nvSpPr>
         <p:spPr>
           <a:xfrm>
-            <a:off x="2873943" y="2558040"/>
-            <a:ext cx="1323049" cy="346760"/>
+            <a:off x="2850271" y="2558040"/>
+            <a:ext cx="1346721" cy="346760"/>
           </a:xfrm>
           <a:prstGeom prst="rect">
             <a:avLst/>
@@ -4276,15 +4289,12 @@
       <p:cxnSp>
         <p:nvCxnSpPr>
           <p:cNvPr id="54" name="Straight Arrow Connector 53"/>
-          <p:cNvCxnSpPr>
-            <a:stCxn id="56" idx="3"/>
-            <a:endCxn id="52" idx="1"/>
-          </p:cNvCxnSpPr>
+          <p:cNvCxnSpPr/>
           <p:nvPr/>
         </p:nvCxnSpPr>
         <p:spPr>
           <a:xfrm>
-            <a:off x="2653133" y="2726136"/>
+            <a:off x="2590800" y="2726136"/>
             <a:ext cx="220810" cy="5284"/>
           </a:xfrm>
           <a:prstGeom prst="straightConnector1">
@@ -4324,7 +4334,7 @@
         </p:nvSpPr>
         <p:spPr>
           <a:xfrm>
-            <a:off x="2417085" y="2639446"/>
+            <a:off x="2359305" y="2639446"/>
             <a:ext cx="236048" cy="173380"/>
           </a:xfrm>
           <a:prstGeom prst="flowChartDecision">
@@ -4627,7 +4637,7 @@
                   </a:schemeClr>
                 </a:solidFill>
               </a:rPr>
-              <a:t>AddressBook</a:t>
+              <a:t>TaskManager</a:t>
             </a:r>
             <a:endParaRPr lang="en-SG" sz="1050" b="1" dirty="0">
               <a:solidFill>
@@ -4780,7 +4790,7 @@
                   </a:schemeClr>
                 </a:solidFill>
               </a:rPr>
-              <a:t>XmlAdaptedPerson</a:t>
+              <a:t>XmlAdaptedTask</a:t>
             </a:r>
             <a:endParaRPr lang="en-SG" sz="1050" b="1" dirty="0">
               <a:solidFill>

</xml_diff>

<commit_message>
Update Storage component class diagrams
</commit_message>
<xml_diff>
--- a/docs/diagrams/StorageComponentClassDiagram.pptx
+++ b/docs/diagrams/StorageComponentClassDiagram.pptx
@@ -107,6 +107,22 @@
       </a:defRPr>
     </a:lvl9pPr>
   </p:defaultTextStyle>
+  <p:extLst>
+    <p:ext uri="{EFAFB233-063F-42B5-8137-9DF3F51BA10A}">
+      <p15:sldGuideLst xmlns:p15="http://schemas.microsoft.com/office/powerpoint/2012/main">
+        <p15:guide id="1" orient="horz" pos="1488">
+          <p15:clr>
+            <a:srgbClr val="A4A3A4"/>
+          </p15:clr>
+        </p15:guide>
+        <p15:guide id="2" pos="2880">
+          <p15:clr>
+            <a:srgbClr val="A4A3A4"/>
+          </p15:clr>
+        </p15:guide>
+      </p15:sldGuideLst>
+    </p:ext>
+  </p:extLst>
 </p:presentation>
 </file>
 
@@ -159,7 +175,7 @@
             </a:lvl1pPr>
           </a:lstStyle>
           <a:p>
-            <a:endParaRPr lang="en-US"/>
+            <a:endParaRPr lang="en-US" dirty="0"/>
           </a:p>
         </p:txBody>
       </p:sp>
@@ -192,9 +208,9 @@
           <a:p>
             <a:fld id="{F5CC4B3F-88C1-4FFA-B1B6-F41C21DC6924}" type="datetimeFigureOut">
               <a:rPr lang="en-US" smtClean="0"/>
-              <a:t>10/16/2016</a:t>
+              <a:t>3/13/17</a:t>
             </a:fld>
-            <a:endParaRPr lang="en-US"/>
+            <a:endParaRPr lang="en-US" dirty="0"/>
           </a:p>
         </p:txBody>
       </p:sp>
@@ -227,7 +243,7 @@
           <a:bodyPr vert="horz" lIns="91440" tIns="45720" rIns="91440" bIns="45720" rtlCol="0" anchor="ctr"/>
           <a:lstStyle/>
           <a:p>
-            <a:endParaRPr lang="en-US"/>
+            <a:endParaRPr lang="en-US" dirty="0"/>
           </a:p>
         </p:txBody>
       </p:sp>
@@ -318,7 +334,7 @@
             </a:lvl1pPr>
           </a:lstStyle>
           <a:p>
-            <a:endParaRPr lang="en-US"/>
+            <a:endParaRPr lang="en-US" dirty="0"/>
           </a:p>
         </p:txBody>
       </p:sp>
@@ -353,7 +369,7 @@
               <a:rPr lang="en-US" smtClean="0"/>
               <a:t>‹#›</a:t>
             </a:fld>
-            <a:endParaRPr lang="en-US"/>
+            <a:endParaRPr lang="en-US" dirty="0"/>
           </a:p>
         </p:txBody>
       </p:sp>
@@ -641,9 +657,9 @@
           <a:p>
             <a:fld id="{78C97017-6FC3-485B-9764-EAC9E56C1D49}" type="datetimeFigureOut">
               <a:rPr lang="en-US" smtClean="0"/>
-              <a:t>10/16/2016</a:t>
+              <a:t>3/13/17</a:t>
             </a:fld>
-            <a:endParaRPr lang="en-US"/>
+            <a:endParaRPr lang="en-US" dirty="0"/>
           </a:p>
         </p:txBody>
       </p:sp>
@@ -662,7 +678,7 @@
           <a:bodyPr/>
           <a:lstStyle/>
           <a:p>
-            <a:endParaRPr lang="en-US"/>
+            <a:endParaRPr lang="en-US" dirty="0"/>
           </a:p>
         </p:txBody>
       </p:sp>
@@ -685,7 +701,7 @@
               <a:rPr lang="en-US" smtClean="0"/>
               <a:t>‹#›</a:t>
             </a:fld>
-            <a:endParaRPr lang="en-US"/>
+            <a:endParaRPr lang="en-US" dirty="0"/>
           </a:p>
         </p:txBody>
       </p:sp>
@@ -811,9 +827,9 @@
           <a:p>
             <a:fld id="{78C97017-6FC3-485B-9764-EAC9E56C1D49}" type="datetimeFigureOut">
               <a:rPr lang="en-US" smtClean="0"/>
-              <a:t>10/16/2016</a:t>
+              <a:t>3/13/17</a:t>
             </a:fld>
-            <a:endParaRPr lang="en-US"/>
+            <a:endParaRPr lang="en-US" dirty="0"/>
           </a:p>
         </p:txBody>
       </p:sp>
@@ -832,7 +848,7 @@
           <a:bodyPr/>
           <a:lstStyle/>
           <a:p>
-            <a:endParaRPr lang="en-US"/>
+            <a:endParaRPr lang="en-US" dirty="0"/>
           </a:p>
         </p:txBody>
       </p:sp>
@@ -855,7 +871,7 @@
               <a:rPr lang="en-US" smtClean="0"/>
               <a:t>‹#›</a:t>
             </a:fld>
-            <a:endParaRPr lang="en-US"/>
+            <a:endParaRPr lang="en-US" dirty="0"/>
           </a:p>
         </p:txBody>
       </p:sp>
@@ -991,9 +1007,9 @@
           <a:p>
             <a:fld id="{78C97017-6FC3-485B-9764-EAC9E56C1D49}" type="datetimeFigureOut">
               <a:rPr lang="en-US" smtClean="0"/>
-              <a:t>10/16/2016</a:t>
+              <a:t>3/13/17</a:t>
             </a:fld>
-            <a:endParaRPr lang="en-US"/>
+            <a:endParaRPr lang="en-US" dirty="0"/>
           </a:p>
         </p:txBody>
       </p:sp>
@@ -1012,7 +1028,7 @@
           <a:bodyPr/>
           <a:lstStyle/>
           <a:p>
-            <a:endParaRPr lang="en-US"/>
+            <a:endParaRPr lang="en-US" dirty="0"/>
           </a:p>
         </p:txBody>
       </p:sp>
@@ -1035,7 +1051,7 @@
               <a:rPr lang="en-US" smtClean="0"/>
               <a:t>‹#›</a:t>
             </a:fld>
-            <a:endParaRPr lang="en-US"/>
+            <a:endParaRPr lang="en-US" dirty="0"/>
           </a:p>
         </p:txBody>
       </p:sp>
@@ -1161,9 +1177,9 @@
           <a:p>
             <a:fld id="{78C97017-6FC3-485B-9764-EAC9E56C1D49}" type="datetimeFigureOut">
               <a:rPr lang="en-US" smtClean="0"/>
-              <a:t>10/16/2016</a:t>
+              <a:t>3/13/17</a:t>
             </a:fld>
-            <a:endParaRPr lang="en-US"/>
+            <a:endParaRPr lang="en-US" dirty="0"/>
           </a:p>
         </p:txBody>
       </p:sp>
@@ -1182,7 +1198,7 @@
           <a:bodyPr/>
           <a:lstStyle/>
           <a:p>
-            <a:endParaRPr lang="en-US"/>
+            <a:endParaRPr lang="en-US" dirty="0"/>
           </a:p>
         </p:txBody>
       </p:sp>
@@ -1205,7 +1221,7 @@
               <a:rPr lang="en-US" smtClean="0"/>
               <a:t>‹#›</a:t>
             </a:fld>
-            <a:endParaRPr lang="en-US"/>
+            <a:endParaRPr lang="en-US" dirty="0"/>
           </a:p>
         </p:txBody>
       </p:sp>
@@ -1407,9 +1423,9 @@
           <a:p>
             <a:fld id="{78C97017-6FC3-485B-9764-EAC9E56C1D49}" type="datetimeFigureOut">
               <a:rPr lang="en-US" smtClean="0"/>
-              <a:t>10/16/2016</a:t>
+              <a:t>3/13/17</a:t>
             </a:fld>
-            <a:endParaRPr lang="en-US"/>
+            <a:endParaRPr lang="en-US" dirty="0"/>
           </a:p>
         </p:txBody>
       </p:sp>
@@ -1428,7 +1444,7 @@
           <a:bodyPr/>
           <a:lstStyle/>
           <a:p>
-            <a:endParaRPr lang="en-US"/>
+            <a:endParaRPr lang="en-US" dirty="0"/>
           </a:p>
         </p:txBody>
       </p:sp>
@@ -1451,7 +1467,7 @@
               <a:rPr lang="en-US" smtClean="0"/>
               <a:t>‹#›</a:t>
             </a:fld>
-            <a:endParaRPr lang="en-US"/>
+            <a:endParaRPr lang="en-US" dirty="0"/>
           </a:p>
         </p:txBody>
       </p:sp>
@@ -1695,9 +1711,9 @@
           <a:p>
             <a:fld id="{78C97017-6FC3-485B-9764-EAC9E56C1D49}" type="datetimeFigureOut">
               <a:rPr lang="en-US" smtClean="0"/>
-              <a:t>10/16/2016</a:t>
+              <a:t>3/13/17</a:t>
             </a:fld>
-            <a:endParaRPr lang="en-US"/>
+            <a:endParaRPr lang="en-US" dirty="0"/>
           </a:p>
         </p:txBody>
       </p:sp>
@@ -1716,7 +1732,7 @@
           <a:bodyPr/>
           <a:lstStyle/>
           <a:p>
-            <a:endParaRPr lang="en-US"/>
+            <a:endParaRPr lang="en-US" dirty="0"/>
           </a:p>
         </p:txBody>
       </p:sp>
@@ -1739,7 +1755,7 @@
               <a:rPr lang="en-US" smtClean="0"/>
               <a:t>‹#›</a:t>
             </a:fld>
-            <a:endParaRPr lang="en-US"/>
+            <a:endParaRPr lang="en-US" dirty="0"/>
           </a:p>
         </p:txBody>
       </p:sp>
@@ -2117,9 +2133,9 @@
           <a:p>
             <a:fld id="{78C97017-6FC3-485B-9764-EAC9E56C1D49}" type="datetimeFigureOut">
               <a:rPr lang="en-US" smtClean="0"/>
-              <a:t>10/16/2016</a:t>
+              <a:t>3/13/17</a:t>
             </a:fld>
-            <a:endParaRPr lang="en-US"/>
+            <a:endParaRPr lang="en-US" dirty="0"/>
           </a:p>
         </p:txBody>
       </p:sp>
@@ -2138,7 +2154,7 @@
           <a:bodyPr/>
           <a:lstStyle/>
           <a:p>
-            <a:endParaRPr lang="en-US"/>
+            <a:endParaRPr lang="en-US" dirty="0"/>
           </a:p>
         </p:txBody>
       </p:sp>
@@ -2161,7 +2177,7 @@
               <a:rPr lang="en-US" smtClean="0"/>
               <a:t>‹#›</a:t>
             </a:fld>
-            <a:endParaRPr lang="en-US"/>
+            <a:endParaRPr lang="en-US" dirty="0"/>
           </a:p>
         </p:txBody>
       </p:sp>
@@ -2235,9 +2251,9 @@
           <a:p>
             <a:fld id="{78C97017-6FC3-485B-9764-EAC9E56C1D49}" type="datetimeFigureOut">
               <a:rPr lang="en-US" smtClean="0"/>
-              <a:t>10/16/2016</a:t>
+              <a:t>3/13/17</a:t>
             </a:fld>
-            <a:endParaRPr lang="en-US"/>
+            <a:endParaRPr lang="en-US" dirty="0"/>
           </a:p>
         </p:txBody>
       </p:sp>
@@ -2256,7 +2272,7 @@
           <a:bodyPr/>
           <a:lstStyle/>
           <a:p>
-            <a:endParaRPr lang="en-US"/>
+            <a:endParaRPr lang="en-US" dirty="0"/>
           </a:p>
         </p:txBody>
       </p:sp>
@@ -2279,7 +2295,7 @@
               <a:rPr lang="en-US" smtClean="0"/>
               <a:t>‹#›</a:t>
             </a:fld>
-            <a:endParaRPr lang="en-US"/>
+            <a:endParaRPr lang="en-US" dirty="0"/>
           </a:p>
         </p:txBody>
       </p:sp>
@@ -2330,9 +2346,9 @@
           <a:p>
             <a:fld id="{78C97017-6FC3-485B-9764-EAC9E56C1D49}" type="datetimeFigureOut">
               <a:rPr lang="en-US" smtClean="0"/>
-              <a:t>10/16/2016</a:t>
+              <a:t>3/13/17</a:t>
             </a:fld>
-            <a:endParaRPr lang="en-US"/>
+            <a:endParaRPr lang="en-US" dirty="0"/>
           </a:p>
         </p:txBody>
       </p:sp>
@@ -2351,7 +2367,7 @@
           <a:bodyPr/>
           <a:lstStyle/>
           <a:p>
-            <a:endParaRPr lang="en-US"/>
+            <a:endParaRPr lang="en-US" dirty="0"/>
           </a:p>
         </p:txBody>
       </p:sp>
@@ -2374,7 +2390,7 @@
               <a:rPr lang="en-US" smtClean="0"/>
               <a:t>‹#›</a:t>
             </a:fld>
-            <a:endParaRPr lang="en-US"/>
+            <a:endParaRPr lang="en-US" dirty="0"/>
           </a:p>
         </p:txBody>
       </p:sp>
@@ -2607,9 +2623,9 @@
           <a:p>
             <a:fld id="{78C97017-6FC3-485B-9764-EAC9E56C1D49}" type="datetimeFigureOut">
               <a:rPr lang="en-US" smtClean="0"/>
-              <a:t>10/16/2016</a:t>
+              <a:t>3/13/17</a:t>
             </a:fld>
-            <a:endParaRPr lang="en-US"/>
+            <a:endParaRPr lang="en-US" dirty="0"/>
           </a:p>
         </p:txBody>
       </p:sp>
@@ -2628,7 +2644,7 @@
           <a:bodyPr/>
           <a:lstStyle/>
           <a:p>
-            <a:endParaRPr lang="en-US"/>
+            <a:endParaRPr lang="en-US" dirty="0"/>
           </a:p>
         </p:txBody>
       </p:sp>
@@ -2651,7 +2667,7 @@
               <a:rPr lang="en-US" smtClean="0"/>
               <a:t>‹#›</a:t>
             </a:fld>
-            <a:endParaRPr lang="en-US"/>
+            <a:endParaRPr lang="en-US" dirty="0"/>
           </a:p>
         </p:txBody>
       </p:sp>
@@ -2774,7 +2790,7 @@
             </a:lvl9pPr>
           </a:lstStyle>
           <a:p>
-            <a:endParaRPr lang="en-US"/>
+            <a:endParaRPr lang="en-US" dirty="0"/>
           </a:p>
         </p:txBody>
       </p:sp>
@@ -2860,9 +2876,9 @@
           <a:p>
             <a:fld id="{78C97017-6FC3-485B-9764-EAC9E56C1D49}" type="datetimeFigureOut">
               <a:rPr lang="en-US" smtClean="0"/>
-              <a:t>10/16/2016</a:t>
+              <a:t>3/13/17</a:t>
             </a:fld>
-            <a:endParaRPr lang="en-US"/>
+            <a:endParaRPr lang="en-US" dirty="0"/>
           </a:p>
         </p:txBody>
       </p:sp>
@@ -2881,7 +2897,7 @@
           <a:bodyPr/>
           <a:lstStyle/>
           <a:p>
-            <a:endParaRPr lang="en-US"/>
+            <a:endParaRPr lang="en-US" dirty="0"/>
           </a:p>
         </p:txBody>
       </p:sp>
@@ -2904,7 +2920,7 @@
               <a:rPr lang="en-US" smtClean="0"/>
               <a:t>‹#›</a:t>
             </a:fld>
-            <a:endParaRPr lang="en-US"/>
+            <a:endParaRPr lang="en-US" dirty="0"/>
           </a:p>
         </p:txBody>
       </p:sp>
@@ -3073,9 +3089,9 @@
           <a:p>
             <a:fld id="{78C97017-6FC3-485B-9764-EAC9E56C1D49}" type="datetimeFigureOut">
               <a:rPr lang="en-US" smtClean="0"/>
-              <a:t>10/16/2016</a:t>
+              <a:t>3/13/17</a:t>
             </a:fld>
-            <a:endParaRPr lang="en-US"/>
+            <a:endParaRPr lang="en-US" dirty="0"/>
           </a:p>
         </p:txBody>
       </p:sp>
@@ -3112,7 +3128,7 @@
             </a:lvl1pPr>
           </a:lstStyle>
           <a:p>
-            <a:endParaRPr lang="en-US"/>
+            <a:endParaRPr lang="en-US" dirty="0"/>
           </a:p>
         </p:txBody>
       </p:sp>
@@ -3153,7 +3169,7 @@
               <a:rPr lang="en-US" smtClean="0"/>
               <a:t>‹#›</a:t>
             </a:fld>
-            <a:endParaRPr lang="en-US"/>
+            <a:endParaRPr lang="en-US" dirty="0"/>
           </a:p>
         </p:txBody>
       </p:sp>
@@ -3456,8 +3472,8 @@
         </p:nvSpPr>
         <p:spPr>
           <a:xfrm>
-            <a:off x="1119865" y="2086382"/>
-            <a:ext cx="7871735" cy="1723618"/>
+            <a:off x="381000" y="2209800"/>
+            <a:ext cx="8458200" cy="2667000"/>
           </a:xfrm>
           <a:prstGeom prst="roundRect">
             <a:avLst>
@@ -3521,7 +3537,7 @@
         </p:nvSpPr>
         <p:spPr>
           <a:xfrm>
-            <a:off x="2877180" y="3158440"/>
+            <a:off x="2419979" y="3281858"/>
             <a:ext cx="1323049" cy="346760"/>
           </a:xfrm>
           <a:prstGeom prst="rect">
@@ -3576,12 +3592,20 @@
               </a:rPr>
             </a:br>
             <a:r>
-              <a:rPr lang="en-US" sz="1050" dirty="0" err="1" smtClean="0">
+              <a:rPr lang="en-US" sz="1050" dirty="0" smtClean="0">
                 <a:solidFill>
                   <a:schemeClr val="bg1"/>
                 </a:solidFill>
               </a:rPr>
-              <a:t>AddressBookStorage</a:t>
+              <a:t>Task</a:t>
+            </a:r>
+            <a:r>
+              <a:rPr lang="en-US" sz="1050" dirty="0" smtClean="0">
+                <a:solidFill>
+                  <a:schemeClr val="bg1"/>
+                </a:solidFill>
+              </a:rPr>
+              <a:t>BossStorage</a:t>
             </a:r>
             <a:endParaRPr lang="en-SG" sz="1050" dirty="0">
               <a:solidFill>
@@ -3599,7 +3623,7 @@
         </p:nvSpPr>
         <p:spPr>
           <a:xfrm rot="16200000">
-            <a:off x="1683963" y="2868687"/>
+            <a:off x="1226762" y="2992105"/>
             <a:ext cx="1093635" cy="346760"/>
           </a:xfrm>
           <a:prstGeom prst="rect">
@@ -3639,7 +3663,7 @@
           <a:p>
             <a:pPr algn="ctr"/>
             <a:r>
-              <a:rPr lang="en-US" sz="1050" dirty="0" err="1" smtClean="0">
+              <a:rPr lang="en-US" sz="1050" dirty="0" smtClean="0">
                 <a:solidFill>
                   <a:schemeClr val="bg1"/>
                 </a:solidFill>
@@ -3662,7 +3686,7 @@
         </p:nvSpPr>
         <p:spPr>
           <a:xfrm rot="16200000">
-            <a:off x="956202" y="2861202"/>
+            <a:off x="499001" y="2984620"/>
             <a:ext cx="1093635" cy="346760"/>
           </a:xfrm>
           <a:prstGeom prst="rect">
@@ -3736,7 +3760,7 @@
         </p:nvSpPr>
         <p:spPr>
           <a:xfrm rot="16200000">
-            <a:off x="1626910" y="2952291"/>
+            <a:off x="1169709" y="3075709"/>
             <a:ext cx="270504" cy="175523"/>
           </a:xfrm>
           <a:prstGeom prst="triangle">
@@ -3775,7 +3799,7 @@
           <a:lstStyle/>
           <a:p>
             <a:pPr algn="ctr"/>
-            <a:endParaRPr lang="en-SG" sz="1050">
+            <a:endParaRPr lang="en-SG" sz="1050" dirty="0">
               <a:solidFill>
                 <a:schemeClr val="bg1"/>
               </a:solidFill>
@@ -3794,7 +3818,7 @@
         </p:nvCxnSpPr>
         <p:spPr>
           <a:xfrm>
-            <a:off x="2656370" y="3326536"/>
+            <a:off x="2199169" y="3449954"/>
             <a:ext cx="220810" cy="5284"/>
           </a:xfrm>
           <a:prstGeom prst="straightConnector1">
@@ -3834,7 +3858,7 @@
         </p:nvCxnSpPr>
         <p:spPr>
           <a:xfrm>
-            <a:off x="910091" y="3040053"/>
+            <a:off x="452890" y="3163471"/>
             <a:ext cx="419548" cy="2860"/>
           </a:xfrm>
           <a:prstGeom prst="bentConnector3">
@@ -3879,7 +3903,7 @@
         </p:nvCxnSpPr>
         <p:spPr>
           <a:xfrm flipV="1">
-            <a:off x="1849924" y="3040052"/>
+            <a:off x="1392723" y="3163470"/>
             <a:ext cx="216105" cy="1"/>
           </a:xfrm>
           <a:prstGeom prst="line">
@@ -3920,7 +3944,7 @@
         </p:nvSpPr>
         <p:spPr>
           <a:xfrm>
-            <a:off x="2420322" y="3239846"/>
+            <a:off x="1963121" y="3363264"/>
             <a:ext cx="236048" cy="173380"/>
           </a:xfrm>
           <a:prstGeom prst="flowChartDecision">
@@ -3955,7 +3979,7 @@
           <a:lstStyle/>
           <a:p>
             <a:pPr algn="ctr"/>
-            <a:endParaRPr lang="en-US" sz="1050">
+            <a:endParaRPr lang="en-US" sz="1050" dirty="0">
               <a:solidFill>
                 <a:schemeClr val="bg1"/>
               </a:solidFill>
@@ -3974,7 +3998,7 @@
         </p:nvCxnSpPr>
         <p:spPr>
           <a:xfrm flipV="1">
-            <a:off x="4398041" y="3331820"/>
+            <a:off x="3940840" y="3455238"/>
             <a:ext cx="223324" cy="1"/>
           </a:xfrm>
           <a:prstGeom prst="bentConnector3">
@@ -4017,7 +4041,7 @@
         </p:nvSpPr>
         <p:spPr>
           <a:xfrm rot="5400000" flipV="1">
-            <a:off x="4175027" y="3244059"/>
+            <a:off x="3717826" y="3367477"/>
             <a:ext cx="270504" cy="175523"/>
           </a:xfrm>
           <a:prstGeom prst="triangle">
@@ -4056,7 +4080,7 @@
           <a:lstStyle/>
           <a:p>
             <a:pPr algn="ctr"/>
-            <a:endParaRPr lang="en-SG" sz="1050">
+            <a:endParaRPr lang="en-SG" sz="1050" dirty="0">
               <a:solidFill>
                 <a:schemeClr val="bg1"/>
               </a:solidFill>
@@ -4075,7 +4099,7 @@
         </p:nvCxnSpPr>
         <p:spPr>
           <a:xfrm>
-            <a:off x="5791200" y="3331820"/>
+            <a:off x="5333999" y="3455238"/>
             <a:ext cx="228600" cy="1970"/>
           </a:xfrm>
           <a:prstGeom prst="bentConnector3">
@@ -4118,7 +4142,7 @@
         </p:nvSpPr>
         <p:spPr>
           <a:xfrm>
-            <a:off x="4621365" y="3158440"/>
+            <a:off x="4164164" y="3281858"/>
             <a:ext cx="1169835" cy="346760"/>
           </a:xfrm>
           <a:prstGeom prst="rect">
@@ -4147,14 +4171,14 @@
           <a:p>
             <a:pPr algn="ctr"/>
             <a:r>
-              <a:rPr lang="en-US" sz="1050" b="1" dirty="0" err="1" smtClean="0">
+              <a:rPr lang="en-US" sz="1050" b="1" dirty="0" smtClean="0">
                 <a:solidFill>
                   <a:schemeClr val="accent6">
                     <a:lumMod val="75000"/>
                   </a:schemeClr>
                 </a:solidFill>
               </a:rPr>
-              <a:t>XmlAddressBook</a:t>
+              <a:t>XmlTaskBoss</a:t>
             </a:r>
             <a:r>
               <a:rPr lang="en-US" sz="1050" b="1" dirty="0" smtClean="0">
@@ -4203,7 +4227,7 @@
         </p:nvSpPr>
         <p:spPr>
           <a:xfrm>
-            <a:off x="2873943" y="2558040"/>
+            <a:off x="2416742" y="2681458"/>
             <a:ext cx="1323049" cy="346760"/>
           </a:xfrm>
           <a:prstGeom prst="rect">
@@ -4258,7 +4282,7 @@
               </a:rPr>
             </a:br>
             <a:r>
-              <a:rPr lang="en-US" sz="1050" dirty="0" err="1" smtClean="0">
+              <a:rPr lang="en-US" sz="1050" dirty="0" smtClean="0">
                 <a:solidFill>
                   <a:schemeClr val="bg1"/>
                 </a:solidFill>
@@ -4284,7 +4308,7 @@
         </p:nvCxnSpPr>
         <p:spPr>
           <a:xfrm>
-            <a:off x="2653133" y="2726136"/>
+            <a:off x="2195932" y="2849554"/>
             <a:ext cx="220810" cy="5284"/>
           </a:xfrm>
           <a:prstGeom prst="straightConnector1">
@@ -4324,7 +4348,7 @@
         </p:nvSpPr>
         <p:spPr>
           <a:xfrm>
-            <a:off x="2417085" y="2639446"/>
+            <a:off x="1959884" y="2762864"/>
             <a:ext cx="236048" cy="173380"/>
           </a:xfrm>
           <a:prstGeom prst="flowChartDecision">
@@ -4359,7 +4383,7 @@
           <a:lstStyle/>
           <a:p>
             <a:pPr algn="ctr"/>
-            <a:endParaRPr lang="en-US" sz="1050">
+            <a:endParaRPr lang="en-US" sz="1050" dirty="0">
               <a:solidFill>
                 <a:schemeClr val="bg1"/>
               </a:solidFill>
@@ -4378,7 +4402,7 @@
         </p:nvCxnSpPr>
         <p:spPr>
           <a:xfrm flipV="1">
-            <a:off x="4394804" y="2731420"/>
+            <a:off x="3937603" y="2854838"/>
             <a:ext cx="223324" cy="1"/>
           </a:xfrm>
           <a:prstGeom prst="bentConnector3">
@@ -4421,7 +4445,7 @@
         </p:nvSpPr>
         <p:spPr>
           <a:xfrm rot="5400000" flipV="1">
-            <a:off x="4171790" y="2643659"/>
+            <a:off x="3714589" y="2767077"/>
             <a:ext cx="270504" cy="175523"/>
           </a:xfrm>
           <a:prstGeom prst="triangle">
@@ -4460,7 +4484,7 @@
           <a:lstStyle/>
           <a:p>
             <a:pPr algn="ctr"/>
-            <a:endParaRPr lang="en-SG" sz="1050">
+            <a:endParaRPr lang="en-SG" sz="1050" dirty="0">
               <a:solidFill>
                 <a:schemeClr val="bg1"/>
               </a:solidFill>
@@ -4476,7 +4500,7 @@
         </p:nvSpPr>
         <p:spPr>
           <a:xfrm>
-            <a:off x="4618128" y="2558040"/>
+            <a:off x="4160927" y="2681458"/>
             <a:ext cx="1093635" cy="346760"/>
           </a:xfrm>
           <a:prstGeom prst="rect">
@@ -4516,20 +4540,12 @@
           <a:p>
             <a:pPr algn="ctr"/>
             <a:r>
-              <a:rPr lang="en-US" sz="1050" dirty="0" err="1" smtClean="0">
+              <a:rPr lang="en-US" sz="1050" dirty="0" smtClean="0">
                 <a:solidFill>
                   <a:schemeClr val="bg1"/>
                 </a:solidFill>
               </a:rPr>
               <a:t>JsonUserPrefs</a:t>
-            </a:r>
-            <a:r>
-              <a:rPr lang="en-US" sz="1050" dirty="0" smtClean="0">
-                <a:solidFill>
-                  <a:schemeClr val="bg1"/>
-                </a:solidFill>
-              </a:rPr>
-              <a:t/>
             </a:r>
             <a:br>
               <a:rPr lang="en-US" sz="1050" dirty="0" smtClean="0">
@@ -4562,7 +4578,7 @@
         </p:nvSpPr>
         <p:spPr>
           <a:xfrm>
-            <a:off x="6019800" y="3160410"/>
+            <a:off x="5562599" y="3283828"/>
             <a:ext cx="1200707" cy="346760"/>
           </a:xfrm>
           <a:prstGeom prst="rect">
@@ -4591,7 +4607,7 @@
           <a:p>
             <a:pPr algn="ctr"/>
             <a:r>
-              <a:rPr lang="en-US" sz="1050" b="1" dirty="0" err="1" smtClean="0">
+              <a:rPr lang="en-US" sz="1050" b="1" dirty="0" smtClean="0">
                 <a:solidFill>
                   <a:schemeClr val="accent6">
                     <a:lumMod val="75000"/>
@@ -4599,16 +4615,6 @@
                 </a:solidFill>
               </a:rPr>
               <a:t>XmlSerializable</a:t>
-            </a:r>
-            <a:r>
-              <a:rPr lang="en-US" sz="1050" b="1" dirty="0" smtClean="0">
-                <a:solidFill>
-                  <a:schemeClr val="accent6">
-                    <a:lumMod val="75000"/>
-                  </a:schemeClr>
-                </a:solidFill>
-              </a:rPr>
-              <a:t/>
             </a:r>
             <a:br>
               <a:rPr lang="en-US" sz="1050" b="1" dirty="0" smtClean="0">
@@ -4620,14 +4626,14 @@
               </a:rPr>
             </a:br>
             <a:r>
-              <a:rPr lang="en-US" sz="1050" b="1" dirty="0" err="1" smtClean="0">
+              <a:rPr lang="en-US" sz="1050" b="1" dirty="0" smtClean="0">
                 <a:solidFill>
                   <a:schemeClr val="accent6">
                     <a:lumMod val="75000"/>
                   </a:schemeClr>
                 </a:solidFill>
               </a:rPr>
-              <a:t>AddressBook</a:t>
+              <a:t>TaskBoss</a:t>
             </a:r>
             <a:endParaRPr lang="en-SG" sz="1050" b="1" dirty="0">
               <a:solidFill>
@@ -4643,15 +4649,15 @@
         <p:nvCxnSpPr>
           <p:cNvPr id="70" name="Elbow Connector 122"/>
           <p:cNvCxnSpPr>
-            <a:stCxn id="74" idx="0"/>
-            <a:endCxn id="73" idx="2"/>
+            <a:stCxn id="74" idx="2"/>
+            <a:endCxn id="73" idx="0"/>
           </p:cNvCxnSpPr>
           <p:nvPr/>
         </p:nvCxnSpPr>
         <p:spPr>
-          <a:xfrm rot="5400000" flipH="1" flipV="1">
-            <a:off x="8077993" y="2992020"/>
-            <a:ext cx="335208" cy="12700"/>
+          <a:xfrm rot="16200000" flipH="1">
+            <a:off x="7682455" y="3812602"/>
+            <a:ext cx="367970" cy="1"/>
           </a:xfrm>
           <a:prstGeom prst="bentConnector3">
             <a:avLst>
@@ -4688,7 +4694,63 @@
         </p:nvSpPr>
         <p:spPr>
           <a:xfrm>
-            <a:off x="7615738" y="2477656"/>
+            <a:off x="7162513" y="3996588"/>
+            <a:ext cx="1407855" cy="346760"/>
+          </a:xfrm>
+          <a:prstGeom prst="rect">
+            <a:avLst/>
+          </a:prstGeom>
+          <a:ln w="19050"/>
+          <a:effectLst/>
+        </p:spPr>
+        <p:style>
+          <a:lnRef idx="1">
+            <a:schemeClr val="accent6"/>
+          </a:lnRef>
+          <a:fillRef idx="2">
+            <a:schemeClr val="accent6"/>
+          </a:fillRef>
+          <a:effectRef idx="1">
+            <a:schemeClr val="accent6"/>
+          </a:effectRef>
+          <a:fontRef idx="minor">
+            <a:schemeClr val="dk1"/>
+          </a:fontRef>
+        </p:style>
+        <p:txBody>
+          <a:bodyPr rtlCol="0" anchor="ctr"/>
+          <a:lstStyle/>
+          <a:p>
+            <a:pPr algn="ctr"/>
+            <a:r>
+              <a:rPr lang="en-US" sz="1050" b="1" dirty="0" smtClean="0">
+                <a:solidFill>
+                  <a:schemeClr val="accent6">
+                    <a:lumMod val="75000"/>
+                  </a:schemeClr>
+                </a:solidFill>
+              </a:rPr>
+              <a:t>XmlAdaptedCategory</a:t>
+            </a:r>
+            <a:endParaRPr lang="en-SG" sz="1050" b="1" dirty="0">
+              <a:solidFill>
+                <a:schemeClr val="accent6">
+                  <a:lumMod val="75000"/>
+                </a:schemeClr>
+              </a:solidFill>
+            </a:endParaRPr>
+          </a:p>
+        </p:txBody>
+      </p:sp>
+      <p:sp>
+        <p:nvSpPr>
+          <p:cNvPr id="74" name="Rectangle 8"/>
+          <p:cNvSpPr/>
+          <p:nvPr/>
+        </p:nvSpPr>
+        <p:spPr>
+          <a:xfrm>
+            <a:off x="7236581" y="3281858"/>
             <a:ext cx="1259718" cy="346760"/>
           </a:xfrm>
           <a:prstGeom prst="rect">
@@ -4717,70 +4779,14 @@
           <a:p>
             <a:pPr algn="ctr"/>
             <a:r>
-              <a:rPr lang="en-US" sz="1050" b="1" dirty="0" err="1" smtClean="0">
+              <a:rPr lang="en-US" sz="1050" b="1" dirty="0" smtClean="0">
                 <a:solidFill>
                   <a:schemeClr val="accent6">
                     <a:lumMod val="75000"/>
                   </a:schemeClr>
                 </a:solidFill>
               </a:rPr>
-              <a:t>XmlAdaptedTag</a:t>
-            </a:r>
-            <a:endParaRPr lang="en-SG" sz="1050" b="1" dirty="0">
-              <a:solidFill>
-                <a:schemeClr val="accent6">
-                  <a:lumMod val="75000"/>
-                </a:schemeClr>
-              </a:solidFill>
-            </a:endParaRPr>
-          </a:p>
-        </p:txBody>
-      </p:sp>
-      <p:sp>
-        <p:nvSpPr>
-          <p:cNvPr id="74" name="Rectangle 8"/>
-          <p:cNvSpPr/>
-          <p:nvPr/>
-        </p:nvSpPr>
-        <p:spPr>
-          <a:xfrm>
-            <a:off x="7615738" y="3159624"/>
-            <a:ext cx="1259718" cy="346760"/>
-          </a:xfrm>
-          <a:prstGeom prst="rect">
-            <a:avLst/>
-          </a:prstGeom>
-          <a:ln w="19050"/>
-          <a:effectLst/>
-        </p:spPr>
-        <p:style>
-          <a:lnRef idx="1">
-            <a:schemeClr val="accent6"/>
-          </a:lnRef>
-          <a:fillRef idx="2">
-            <a:schemeClr val="accent6"/>
-          </a:fillRef>
-          <a:effectRef idx="1">
-            <a:schemeClr val="accent6"/>
-          </a:effectRef>
-          <a:fontRef idx="minor">
-            <a:schemeClr val="dk1"/>
-          </a:fontRef>
-        </p:style>
-        <p:txBody>
-          <a:bodyPr rtlCol="0" anchor="ctr"/>
-          <a:lstStyle/>
-          <a:p>
-            <a:pPr algn="ctr"/>
-            <a:r>
-              <a:rPr lang="en-US" sz="1050" b="1" dirty="0" err="1" smtClean="0">
-                <a:solidFill>
-                  <a:schemeClr val="accent6">
-                    <a:lumMod val="75000"/>
-                  </a:schemeClr>
-                </a:solidFill>
-              </a:rPr>
-              <a:t>XmlAdaptedPerson</a:t>
+              <a:t>XmlAdaptedTask</a:t>
             </a:r>
             <a:endParaRPr lang="en-SG" sz="1050" b="1" dirty="0">
               <a:solidFill>
@@ -4803,8 +4809,8 @@
         </p:nvCxnSpPr>
         <p:spPr>
           <a:xfrm flipV="1">
-            <a:off x="7220507" y="3333004"/>
-            <a:ext cx="395231" cy="786"/>
+            <a:off x="6763306" y="3455238"/>
+            <a:ext cx="473275" cy="1970"/>
           </a:xfrm>
           <a:prstGeom prst="bentConnector3">
             <a:avLst>

</xml_diff>

<commit_message>
update storage component in design section
</commit_message>
<xml_diff>
--- a/docs/diagrams/StorageComponentClassDiagram.pptx
+++ b/docs/diagrams/StorageComponentClassDiagram.pptx
@@ -107,6 +107,22 @@
       </a:defRPr>
     </a:lvl9pPr>
   </p:defaultTextStyle>
+  <p:extLst>
+    <p:ext uri="{EFAFB233-063F-42B5-8137-9DF3F51BA10A}">
+      <p15:sldGuideLst xmlns:p15="http://schemas.microsoft.com/office/powerpoint/2012/main">
+        <p15:guide id="1" orient="horz" pos="1488">
+          <p15:clr>
+            <a:srgbClr val="A4A3A4"/>
+          </p15:clr>
+        </p15:guide>
+        <p15:guide id="2" pos="2880">
+          <p15:clr>
+            <a:srgbClr val="A4A3A4"/>
+          </p15:clr>
+        </p15:guide>
+      </p15:sldGuideLst>
+    </p:ext>
+  </p:extLst>
 </p:presentation>
 </file>
 
@@ -192,7 +208,7 @@
           <a:p>
             <a:fld id="{F5CC4B3F-88C1-4FFA-B1B6-F41C21DC6924}" type="datetimeFigureOut">
               <a:rPr lang="en-US" smtClean="0"/>
-              <a:t>10/16/2016</a:t>
+              <a:t>3/15/2017</a:t>
             </a:fld>
             <a:endParaRPr lang="en-US"/>
           </a:p>
@@ -641,7 +657,7 @@
           <a:p>
             <a:fld id="{78C97017-6FC3-485B-9764-EAC9E56C1D49}" type="datetimeFigureOut">
               <a:rPr lang="en-US" smtClean="0"/>
-              <a:t>10/16/2016</a:t>
+              <a:t>3/15/2017</a:t>
             </a:fld>
             <a:endParaRPr lang="en-US"/>
           </a:p>
@@ -811,7 +827,7 @@
           <a:p>
             <a:fld id="{78C97017-6FC3-485B-9764-EAC9E56C1D49}" type="datetimeFigureOut">
               <a:rPr lang="en-US" smtClean="0"/>
-              <a:t>10/16/2016</a:t>
+              <a:t>3/15/2017</a:t>
             </a:fld>
             <a:endParaRPr lang="en-US"/>
           </a:p>
@@ -991,7 +1007,7 @@
           <a:p>
             <a:fld id="{78C97017-6FC3-485B-9764-EAC9E56C1D49}" type="datetimeFigureOut">
               <a:rPr lang="en-US" smtClean="0"/>
-              <a:t>10/16/2016</a:t>
+              <a:t>3/15/2017</a:t>
             </a:fld>
             <a:endParaRPr lang="en-US"/>
           </a:p>
@@ -1161,7 +1177,7 @@
           <a:p>
             <a:fld id="{78C97017-6FC3-485B-9764-EAC9E56C1D49}" type="datetimeFigureOut">
               <a:rPr lang="en-US" smtClean="0"/>
-              <a:t>10/16/2016</a:t>
+              <a:t>3/15/2017</a:t>
             </a:fld>
             <a:endParaRPr lang="en-US"/>
           </a:p>
@@ -1407,7 +1423,7 @@
           <a:p>
             <a:fld id="{78C97017-6FC3-485B-9764-EAC9E56C1D49}" type="datetimeFigureOut">
               <a:rPr lang="en-US" smtClean="0"/>
-              <a:t>10/16/2016</a:t>
+              <a:t>3/15/2017</a:t>
             </a:fld>
             <a:endParaRPr lang="en-US"/>
           </a:p>
@@ -1695,7 +1711,7 @@
           <a:p>
             <a:fld id="{78C97017-6FC3-485B-9764-EAC9E56C1D49}" type="datetimeFigureOut">
               <a:rPr lang="en-US" smtClean="0"/>
-              <a:t>10/16/2016</a:t>
+              <a:t>3/15/2017</a:t>
             </a:fld>
             <a:endParaRPr lang="en-US"/>
           </a:p>
@@ -2117,7 +2133,7 @@
           <a:p>
             <a:fld id="{78C97017-6FC3-485B-9764-EAC9E56C1D49}" type="datetimeFigureOut">
               <a:rPr lang="en-US" smtClean="0"/>
-              <a:t>10/16/2016</a:t>
+              <a:t>3/15/2017</a:t>
             </a:fld>
             <a:endParaRPr lang="en-US"/>
           </a:p>
@@ -2235,7 +2251,7 @@
           <a:p>
             <a:fld id="{78C97017-6FC3-485B-9764-EAC9E56C1D49}" type="datetimeFigureOut">
               <a:rPr lang="en-US" smtClean="0"/>
-              <a:t>10/16/2016</a:t>
+              <a:t>3/15/2017</a:t>
             </a:fld>
             <a:endParaRPr lang="en-US"/>
           </a:p>
@@ -2330,7 +2346,7 @@
           <a:p>
             <a:fld id="{78C97017-6FC3-485B-9764-EAC9E56C1D49}" type="datetimeFigureOut">
               <a:rPr lang="en-US" smtClean="0"/>
-              <a:t>10/16/2016</a:t>
+              <a:t>3/15/2017</a:t>
             </a:fld>
             <a:endParaRPr lang="en-US"/>
           </a:p>
@@ -2607,7 +2623,7 @@
           <a:p>
             <a:fld id="{78C97017-6FC3-485B-9764-EAC9E56C1D49}" type="datetimeFigureOut">
               <a:rPr lang="en-US" smtClean="0"/>
-              <a:t>10/16/2016</a:t>
+              <a:t>3/15/2017</a:t>
             </a:fld>
             <a:endParaRPr lang="en-US"/>
           </a:p>
@@ -2860,7 +2876,7 @@
           <a:p>
             <a:fld id="{78C97017-6FC3-485B-9764-EAC9E56C1D49}" type="datetimeFigureOut">
               <a:rPr lang="en-US" smtClean="0"/>
-              <a:t>10/16/2016</a:t>
+              <a:t>3/15/2017</a:t>
             </a:fld>
             <a:endParaRPr lang="en-US"/>
           </a:p>
@@ -3073,7 +3089,7 @@
           <a:p>
             <a:fld id="{78C97017-6FC3-485B-9764-EAC9E56C1D49}" type="datetimeFigureOut">
               <a:rPr lang="en-US" smtClean="0"/>
-              <a:t>10/16/2016</a:t>
+              <a:t>3/15/2017</a:t>
             </a:fld>
             <a:endParaRPr lang="en-US"/>
           </a:p>
@@ -3457,7 +3473,7 @@
         <p:spPr>
           <a:xfrm>
             <a:off x="1119865" y="2086382"/>
-            <a:ext cx="7871735" cy="1723618"/>
+            <a:ext cx="7871735" cy="1647418"/>
           </a:xfrm>
           <a:prstGeom prst="roundRect">
             <a:avLst>
@@ -3581,7 +3597,7 @@
                   <a:schemeClr val="bg1"/>
                 </a:solidFill>
               </a:rPr>
-              <a:t>AddressBookStorage</a:t>
+              <a:t>TodoListStorage</a:t>
             </a:r>
             <a:endParaRPr lang="en-SG" sz="1050" dirty="0">
               <a:solidFill>
@@ -4154,7 +4170,7 @@
                   </a:schemeClr>
                 </a:solidFill>
               </a:rPr>
-              <a:t>XmlAddressBook</a:t>
+              <a:t>XmlTodoList</a:t>
             </a:r>
             <a:r>
               <a:rPr lang="en-US" sz="1050" b="1" dirty="0" smtClean="0">
@@ -4627,7 +4643,7 @@
                   </a:schemeClr>
                 </a:solidFill>
               </a:rPr>
-              <a:t>AddressBook</a:t>
+              <a:t>TodoList</a:t>
             </a:r>
             <a:endParaRPr lang="en-SG" sz="1050" b="1" dirty="0">
               <a:solidFill>
@@ -4780,7 +4796,7 @@
                   </a:schemeClr>
                 </a:solidFill>
               </a:rPr>
-              <a:t>XmlAdaptedPerson</a:t>
+              <a:t>XmlAdaptedTask</a:t>
             </a:r>
             <a:endParaRPr lang="en-SG" sz="1050" b="1" dirty="0">
               <a:solidFill>

</xml_diff>

<commit_message>
minor edits to dev guide
</commit_message>
<xml_diff>
--- a/docs/diagrams/StorageComponentClassDiagram.pptx
+++ b/docs/diagrams/StorageComponentClassDiagram.pptx
@@ -107,6 +107,22 @@
       </a:defRPr>
     </a:lvl9pPr>
   </p:defaultTextStyle>
+  <p:extLst>
+    <p:ext uri="{EFAFB233-063F-42B5-8137-9DF3F51BA10A}">
+      <p15:sldGuideLst xmlns:p15="http://schemas.microsoft.com/office/powerpoint/2012/main">
+        <p15:guide id="1" orient="horz" pos="1488">
+          <p15:clr>
+            <a:srgbClr val="A4A3A4"/>
+          </p15:clr>
+        </p15:guide>
+        <p15:guide id="2" pos="2880">
+          <p15:clr>
+            <a:srgbClr val="A4A3A4"/>
+          </p15:clr>
+        </p15:guide>
+      </p15:sldGuideLst>
+    </p:ext>
+  </p:extLst>
 </p:presentation>
 </file>
 
@@ -192,7 +208,7 @@
           <a:p>
             <a:fld id="{F5CC4B3F-88C1-4FFA-B1B6-F41C21DC6924}" type="datetimeFigureOut">
               <a:rPr lang="en-US" smtClean="0"/>
-              <a:t>10/16/2016</a:t>
+              <a:t>3/18/2017</a:t>
             </a:fld>
             <a:endParaRPr lang="en-US"/>
           </a:p>
@@ -641,7 +657,7 @@
           <a:p>
             <a:fld id="{78C97017-6FC3-485B-9764-EAC9E56C1D49}" type="datetimeFigureOut">
               <a:rPr lang="en-US" smtClean="0"/>
-              <a:t>10/16/2016</a:t>
+              <a:t>3/18/2017</a:t>
             </a:fld>
             <a:endParaRPr lang="en-US"/>
           </a:p>
@@ -811,7 +827,7 @@
           <a:p>
             <a:fld id="{78C97017-6FC3-485B-9764-EAC9E56C1D49}" type="datetimeFigureOut">
               <a:rPr lang="en-US" smtClean="0"/>
-              <a:t>10/16/2016</a:t>
+              <a:t>3/18/2017</a:t>
             </a:fld>
             <a:endParaRPr lang="en-US"/>
           </a:p>
@@ -991,7 +1007,7 @@
           <a:p>
             <a:fld id="{78C97017-6FC3-485B-9764-EAC9E56C1D49}" type="datetimeFigureOut">
               <a:rPr lang="en-US" smtClean="0"/>
-              <a:t>10/16/2016</a:t>
+              <a:t>3/18/2017</a:t>
             </a:fld>
             <a:endParaRPr lang="en-US"/>
           </a:p>
@@ -1161,7 +1177,7 @@
           <a:p>
             <a:fld id="{78C97017-6FC3-485B-9764-EAC9E56C1D49}" type="datetimeFigureOut">
               <a:rPr lang="en-US" smtClean="0"/>
-              <a:t>10/16/2016</a:t>
+              <a:t>3/18/2017</a:t>
             </a:fld>
             <a:endParaRPr lang="en-US"/>
           </a:p>
@@ -1407,7 +1423,7 @@
           <a:p>
             <a:fld id="{78C97017-6FC3-485B-9764-EAC9E56C1D49}" type="datetimeFigureOut">
               <a:rPr lang="en-US" smtClean="0"/>
-              <a:t>10/16/2016</a:t>
+              <a:t>3/18/2017</a:t>
             </a:fld>
             <a:endParaRPr lang="en-US"/>
           </a:p>
@@ -1695,7 +1711,7 @@
           <a:p>
             <a:fld id="{78C97017-6FC3-485B-9764-EAC9E56C1D49}" type="datetimeFigureOut">
               <a:rPr lang="en-US" smtClean="0"/>
-              <a:t>10/16/2016</a:t>
+              <a:t>3/18/2017</a:t>
             </a:fld>
             <a:endParaRPr lang="en-US"/>
           </a:p>
@@ -2117,7 +2133,7 @@
           <a:p>
             <a:fld id="{78C97017-6FC3-485B-9764-EAC9E56C1D49}" type="datetimeFigureOut">
               <a:rPr lang="en-US" smtClean="0"/>
-              <a:t>10/16/2016</a:t>
+              <a:t>3/18/2017</a:t>
             </a:fld>
             <a:endParaRPr lang="en-US"/>
           </a:p>
@@ -2235,7 +2251,7 @@
           <a:p>
             <a:fld id="{78C97017-6FC3-485B-9764-EAC9E56C1D49}" type="datetimeFigureOut">
               <a:rPr lang="en-US" smtClean="0"/>
-              <a:t>10/16/2016</a:t>
+              <a:t>3/18/2017</a:t>
             </a:fld>
             <a:endParaRPr lang="en-US"/>
           </a:p>
@@ -2330,7 +2346,7 @@
           <a:p>
             <a:fld id="{78C97017-6FC3-485B-9764-EAC9E56C1D49}" type="datetimeFigureOut">
               <a:rPr lang="en-US" smtClean="0"/>
-              <a:t>10/16/2016</a:t>
+              <a:t>3/18/2017</a:t>
             </a:fld>
             <a:endParaRPr lang="en-US"/>
           </a:p>
@@ -2607,7 +2623,7 @@
           <a:p>
             <a:fld id="{78C97017-6FC3-485B-9764-EAC9E56C1D49}" type="datetimeFigureOut">
               <a:rPr lang="en-US" smtClean="0"/>
-              <a:t>10/16/2016</a:t>
+              <a:t>3/18/2017</a:t>
             </a:fld>
             <a:endParaRPr lang="en-US"/>
           </a:p>
@@ -2860,7 +2876,7 @@
           <a:p>
             <a:fld id="{78C97017-6FC3-485B-9764-EAC9E56C1D49}" type="datetimeFigureOut">
               <a:rPr lang="en-US" smtClean="0"/>
-              <a:t>10/16/2016</a:t>
+              <a:t>3/18/2017</a:t>
             </a:fld>
             <a:endParaRPr lang="en-US"/>
           </a:p>
@@ -3073,7 +3089,7 @@
           <a:p>
             <a:fld id="{78C97017-6FC3-485B-9764-EAC9E56C1D49}" type="datetimeFigureOut">
               <a:rPr lang="en-US" smtClean="0"/>
-              <a:t>10/16/2016</a:t>
+              <a:t>3/18/2017</a:t>
             </a:fld>
             <a:endParaRPr lang="en-US"/>
           </a:p>
@@ -4176,14 +4192,14 @@
               </a:rPr>
             </a:br>
             <a:r>
-              <a:rPr lang="en-US" sz="1050" b="1" dirty="0" smtClean="0">
+              <a:rPr lang="en-US" sz="1050" b="1" dirty="0" err="1" smtClean="0">
                 <a:solidFill>
                   <a:schemeClr val="accent6">
                     <a:lumMod val="75000"/>
                   </a:schemeClr>
                 </a:solidFill>
               </a:rPr>
-              <a:t>Storage</a:t>
+              <a:t>TaskManager</a:t>
             </a:r>
             <a:endParaRPr lang="en-SG" sz="1050" b="1" dirty="0">
               <a:solidFill>
@@ -4627,7 +4643,7 @@
                   </a:schemeClr>
                 </a:solidFill>
               </a:rPr>
-              <a:t>AddressBook</a:t>
+              <a:t>TaskManager</a:t>
             </a:r>
             <a:endParaRPr lang="en-SG" sz="1050" b="1" dirty="0">
               <a:solidFill>
@@ -4780,7 +4796,7 @@
                   </a:schemeClr>
                 </a:solidFill>
               </a:rPr>
-              <a:t>XmlAdaptedPerson</a:t>
+              <a:t>XmlAdaptedTask</a:t>
             </a:r>
             <a:endParaRPr lang="en-SG" sz="1050" b="1" dirty="0">
               <a:solidFill>

</xml_diff>

<commit_message>
Update Developer Guide storage section
</commit_message>
<xml_diff>
--- a/docs/diagrams/StorageComponentClassDiagram.pptx
+++ b/docs/diagrams/StorageComponentClassDiagram.pptx
@@ -208,7 +208,7 @@
           <a:p>
             <a:fld id="{F5CC4B3F-88C1-4FFA-B1B6-F41C21DC6924}" type="datetimeFigureOut">
               <a:rPr lang="en-US" smtClean="0"/>
-              <a:t>3/21/2017</a:t>
+              <a:t>4/3/17</a:t>
             </a:fld>
             <a:endParaRPr lang="en-US"/>
           </a:p>
@@ -654,7 +654,7 @@
           <a:p>
             <a:fld id="{78C97017-6FC3-485B-9764-EAC9E56C1D49}" type="datetimeFigureOut">
               <a:rPr lang="en-US" smtClean="0"/>
-              <a:t>3/21/2017</a:t>
+              <a:t>4/3/17</a:t>
             </a:fld>
             <a:endParaRPr lang="en-US"/>
           </a:p>
@@ -822,7 +822,7 @@
           <a:p>
             <a:fld id="{78C97017-6FC3-485B-9764-EAC9E56C1D49}" type="datetimeFigureOut">
               <a:rPr lang="en-US" smtClean="0"/>
-              <a:t>3/21/2017</a:t>
+              <a:t>4/3/17</a:t>
             </a:fld>
             <a:endParaRPr lang="en-US"/>
           </a:p>
@@ -1000,7 +1000,7 @@
           <a:p>
             <a:fld id="{78C97017-6FC3-485B-9764-EAC9E56C1D49}" type="datetimeFigureOut">
               <a:rPr lang="en-US" smtClean="0"/>
-              <a:t>3/21/2017</a:t>
+              <a:t>4/3/17</a:t>
             </a:fld>
             <a:endParaRPr lang="en-US"/>
           </a:p>
@@ -1168,7 +1168,7 @@
           <a:p>
             <a:fld id="{78C97017-6FC3-485B-9764-EAC9E56C1D49}" type="datetimeFigureOut">
               <a:rPr lang="en-US" smtClean="0"/>
-              <a:t>3/21/2017</a:t>
+              <a:t>4/3/17</a:t>
             </a:fld>
             <a:endParaRPr lang="en-US"/>
           </a:p>
@@ -1413,7 +1413,7 @@
           <a:p>
             <a:fld id="{78C97017-6FC3-485B-9764-EAC9E56C1D49}" type="datetimeFigureOut">
               <a:rPr lang="en-US" smtClean="0"/>
-              <a:t>3/21/2017</a:t>
+              <a:t>4/3/17</a:t>
             </a:fld>
             <a:endParaRPr lang="en-US"/>
           </a:p>
@@ -1698,7 +1698,7 @@
           <a:p>
             <a:fld id="{78C97017-6FC3-485B-9764-EAC9E56C1D49}" type="datetimeFigureOut">
               <a:rPr lang="en-US" smtClean="0"/>
-              <a:t>3/21/2017</a:t>
+              <a:t>4/3/17</a:t>
             </a:fld>
             <a:endParaRPr lang="en-US"/>
           </a:p>
@@ -2117,7 +2117,7 @@
           <a:p>
             <a:fld id="{78C97017-6FC3-485B-9764-EAC9E56C1D49}" type="datetimeFigureOut">
               <a:rPr lang="en-US" smtClean="0"/>
-              <a:t>3/21/2017</a:t>
+              <a:t>4/3/17</a:t>
             </a:fld>
             <a:endParaRPr lang="en-US"/>
           </a:p>
@@ -2234,7 +2234,7 @@
           <a:p>
             <a:fld id="{78C97017-6FC3-485B-9764-EAC9E56C1D49}" type="datetimeFigureOut">
               <a:rPr lang="en-US" smtClean="0"/>
-              <a:t>3/21/2017</a:t>
+              <a:t>4/3/17</a:t>
             </a:fld>
             <a:endParaRPr lang="en-US"/>
           </a:p>
@@ -2329,7 +2329,7 @@
           <a:p>
             <a:fld id="{78C97017-6FC3-485B-9764-EAC9E56C1D49}" type="datetimeFigureOut">
               <a:rPr lang="en-US" smtClean="0"/>
-              <a:t>3/21/2017</a:t>
+              <a:t>4/3/17</a:t>
             </a:fld>
             <a:endParaRPr lang="en-US"/>
           </a:p>
@@ -2604,7 +2604,7 @@
           <a:p>
             <a:fld id="{78C97017-6FC3-485B-9764-EAC9E56C1D49}" type="datetimeFigureOut">
               <a:rPr lang="en-US" smtClean="0"/>
-              <a:t>3/21/2017</a:t>
+              <a:t>4/3/17</a:t>
             </a:fld>
             <a:endParaRPr lang="en-US"/>
           </a:p>
@@ -2856,7 +2856,7 @@
           <a:p>
             <a:fld id="{78C97017-6FC3-485B-9764-EAC9E56C1D49}" type="datetimeFigureOut">
               <a:rPr lang="en-US" smtClean="0"/>
-              <a:t>3/21/2017</a:t>
+              <a:t>4/3/17</a:t>
             </a:fld>
             <a:endParaRPr lang="en-US"/>
           </a:p>
@@ -3067,7 +3067,7 @@
           <a:p>
             <a:fld id="{78C97017-6FC3-485B-9764-EAC9E56C1D49}" type="datetimeFigureOut">
               <a:rPr lang="en-US" smtClean="0"/>
-              <a:t>3/21/2017</a:t>
+              <a:t>4/3/17</a:t>
             </a:fld>
             <a:endParaRPr lang="en-US"/>
           </a:p>
@@ -4150,6 +4150,16 @@
               </a:rPr>
               <a:t>XmlWhatsLeft</a:t>
             </a:r>
+            <a:r>
+              <a:rPr lang="en-US" sz="1050" b="1" dirty="0">
+                <a:solidFill>
+                  <a:schemeClr val="accent6">
+                    <a:lumMod val="75000"/>
+                  </a:schemeClr>
+                </a:solidFill>
+              </a:rPr>
+              <a:t/>
+            </a:r>
             <a:br>
               <a:rPr lang="en-US" sz="1050" b="1" dirty="0">
                 <a:solidFill>
@@ -4507,6 +4517,14 @@
               </a:rPr>
               <a:t>JsonUserPrefs</a:t>
             </a:r>
+            <a:r>
+              <a:rPr lang="en-US" sz="1050" dirty="0">
+                <a:solidFill>
+                  <a:schemeClr val="bg1"/>
+                </a:solidFill>
+              </a:rPr>
+              <a:t/>
+            </a:r>
             <a:br>
               <a:rPr lang="en-US" sz="1050" dirty="0">
                 <a:solidFill>
@@ -4576,6 +4594,16 @@
               </a:rPr>
               <a:t>XmlSerializable</a:t>
             </a:r>
+            <a:r>
+              <a:rPr lang="en-US" sz="1050" b="1" dirty="0">
+                <a:solidFill>
+                  <a:schemeClr val="accent6">
+                    <a:lumMod val="75000"/>
+                  </a:schemeClr>
+                </a:solidFill>
+              </a:rPr>
+              <a:t/>
+            </a:r>
             <a:br>
               <a:rPr lang="en-US" sz="1050" b="1" dirty="0">
                 <a:solidFill>
@@ -4611,14 +4639,13 @@
           <p:cNvCxnSpPr>
             <a:cxnSpLocks/>
             <a:stCxn id="74" idx="0"/>
-            <a:endCxn id="73" idx="2"/>
           </p:cNvCxnSpPr>
           <p:nvPr/>
         </p:nvCxnSpPr>
         <p:spPr>
-          <a:xfrm rot="16200000" flipV="1">
-            <a:off x="8087979" y="2982034"/>
-            <a:ext cx="335208" cy="19972"/>
+          <a:xfrm rot="5400000" flipH="1" flipV="1">
+            <a:off x="8139100" y="2628368"/>
+            <a:ext cx="292885" cy="2"/>
           </a:xfrm>
           <a:prstGeom prst="bentConnector3">
             <a:avLst>
@@ -4655,7 +4682,7 @@
         </p:nvSpPr>
         <p:spPr>
           <a:xfrm>
-            <a:off x="7615738" y="2477656"/>
+            <a:off x="7635710" y="2110774"/>
             <a:ext cx="1259718" cy="346760"/>
           </a:xfrm>
           <a:prstGeom prst="rect">
@@ -4711,7 +4738,7 @@
         </p:nvSpPr>
         <p:spPr>
           <a:xfrm>
-            <a:off x="7615738" y="3159624"/>
+            <a:off x="7635710" y="2774811"/>
             <a:ext cx="1299662" cy="346760"/>
           </a:xfrm>
           <a:prstGeom prst="rect">
@@ -4740,14 +4767,24 @@
           <a:p>
             <a:pPr algn="ctr"/>
             <a:r>
-              <a:rPr lang="en-US" sz="1050" b="1" dirty="0" err="1">
+              <a:rPr lang="en-US" sz="1050" b="1" dirty="0" err="1" smtClean="0">
                 <a:solidFill>
                   <a:schemeClr val="accent6">
                     <a:lumMod val="75000"/>
                   </a:schemeClr>
                 </a:solidFill>
               </a:rPr>
-              <a:t>XmlAdaptedActivity</a:t>
+              <a:t>XmlAdapted</a:t>
+            </a:r>
+            <a:r>
+              <a:rPr lang="en-US" altLang="zh-CN" sz="1050" b="1" dirty="0" err="1" smtClean="0">
+                <a:solidFill>
+                  <a:schemeClr val="accent6">
+                    <a:lumMod val="75000"/>
+                  </a:schemeClr>
+                </a:solidFill>
+              </a:rPr>
+              <a:t>Event</a:t>
             </a:r>
             <a:endParaRPr lang="en-SG" sz="1050" b="1" dirty="0">
               <a:solidFill>
@@ -4764,19 +4801,155 @@
           <p:cNvPr id="77" name="Elbow Connector 122"/>
           <p:cNvCxnSpPr>
             <a:cxnSpLocks/>
-            <a:stCxn id="66" idx="3"/>
-            <a:endCxn id="74" idx="1"/>
           </p:cNvCxnSpPr>
           <p:nvPr/>
         </p:nvCxnSpPr>
         <p:spPr>
           <a:xfrm flipV="1">
-            <a:off x="7220507" y="3333004"/>
-            <a:ext cx="395231" cy="786"/>
+            <a:off x="7246040" y="3000940"/>
+            <a:ext cx="381750" cy="259990"/>
           </a:xfrm>
           <a:prstGeom prst="bentConnector3">
             <a:avLst>
               <a:gd name="adj1" fmla="val 50000"/>
+            </a:avLst>
+          </a:prstGeom>
+          <a:ln w="19050">
+            <a:prstDash val="sysDot"/>
+            <a:headEnd type="none" w="med" len="med"/>
+            <a:tailEnd type="arrow" w="med" len="med"/>
+          </a:ln>
+          <a:effectLst/>
+        </p:spPr>
+        <p:style>
+          <a:lnRef idx="1">
+            <a:schemeClr val="accent6"/>
+          </a:lnRef>
+          <a:fillRef idx="2">
+            <a:schemeClr val="accent6"/>
+          </a:fillRef>
+          <a:effectRef idx="1">
+            <a:schemeClr val="accent6"/>
+          </a:effectRef>
+          <a:fontRef idx="minor">
+            <a:schemeClr val="dk1"/>
+          </a:fontRef>
+        </p:style>
+      </p:cxnSp>
+      <p:sp>
+        <p:nvSpPr>
+          <p:cNvPr id="26" name="Rectangle 8"/>
+          <p:cNvSpPr/>
+          <p:nvPr/>
+        </p:nvSpPr>
+        <p:spPr>
+          <a:xfrm>
+            <a:off x="7635710" y="3293953"/>
+            <a:ext cx="1299662" cy="346760"/>
+          </a:xfrm>
+          <a:prstGeom prst="rect">
+            <a:avLst/>
+          </a:prstGeom>
+          <a:ln w="19050"/>
+          <a:effectLst/>
+        </p:spPr>
+        <p:style>
+          <a:lnRef idx="1">
+            <a:schemeClr val="accent6"/>
+          </a:lnRef>
+          <a:fillRef idx="2">
+            <a:schemeClr val="accent6"/>
+          </a:fillRef>
+          <a:effectRef idx="1">
+            <a:schemeClr val="accent6"/>
+          </a:effectRef>
+          <a:fontRef idx="minor">
+            <a:schemeClr val="dk1"/>
+          </a:fontRef>
+        </p:style>
+        <p:txBody>
+          <a:bodyPr rtlCol="0" anchor="ctr"/>
+          <a:lstStyle/>
+          <a:p>
+            <a:pPr algn="ctr"/>
+            <a:r>
+              <a:rPr lang="en-US" sz="1050" b="1" dirty="0" err="1" smtClean="0">
+                <a:solidFill>
+                  <a:schemeClr val="accent6">
+                    <a:lumMod val="75000"/>
+                  </a:schemeClr>
+                </a:solidFill>
+              </a:rPr>
+              <a:t>XmlAdaptedTask</a:t>
+            </a:r>
+            <a:endParaRPr lang="en-SG" sz="1050" b="1" dirty="0">
+              <a:solidFill>
+                <a:schemeClr val="accent6">
+                  <a:lumMod val="75000"/>
+                </a:schemeClr>
+              </a:solidFill>
+            </a:endParaRPr>
+          </a:p>
+        </p:txBody>
+      </p:sp>
+      <p:cxnSp>
+        <p:nvCxnSpPr>
+          <p:cNvPr id="30" name="Elbow Connector 122"/>
+          <p:cNvCxnSpPr>
+            <a:cxnSpLocks/>
+          </p:cNvCxnSpPr>
+          <p:nvPr/>
+        </p:nvCxnSpPr>
+        <p:spPr>
+          <a:xfrm>
+            <a:off x="7234360" y="3408970"/>
+            <a:ext cx="401350" cy="172430"/>
+          </a:xfrm>
+          <a:prstGeom prst="bentConnector3">
+            <a:avLst>
+              <a:gd name="adj1" fmla="val 50000"/>
+            </a:avLst>
+          </a:prstGeom>
+          <a:ln w="19050">
+            <a:prstDash val="sysDot"/>
+            <a:headEnd type="none" w="med" len="med"/>
+            <a:tailEnd type="arrow" w="med" len="med"/>
+          </a:ln>
+          <a:effectLst/>
+        </p:spPr>
+        <p:style>
+          <a:lnRef idx="1">
+            <a:schemeClr val="accent6"/>
+          </a:lnRef>
+          <a:fillRef idx="2">
+            <a:schemeClr val="accent6"/>
+          </a:fillRef>
+          <a:effectRef idx="1">
+            <a:schemeClr val="accent6"/>
+          </a:effectRef>
+          <a:fontRef idx="minor">
+            <a:schemeClr val="dk1"/>
+          </a:fontRef>
+        </p:style>
+      </p:cxnSp>
+      <p:cxnSp>
+        <p:nvCxnSpPr>
+          <p:cNvPr id="37" name="Elbow Connector 122"/>
+          <p:cNvCxnSpPr>
+            <a:cxnSpLocks/>
+            <a:endCxn id="73" idx="1"/>
+          </p:cNvCxnSpPr>
+          <p:nvPr/>
+        </p:nvCxnSpPr>
+        <p:spPr>
+          <a:xfrm rot="16200000" flipV="1">
+            <a:off x="7282346" y="2637519"/>
+            <a:ext cx="1009799" cy="303070"/>
+          </a:xfrm>
+          <a:prstGeom prst="bentConnector4">
+            <a:avLst>
+              <a:gd name="adj1" fmla="val 11231"/>
+              <a:gd name="adj2" fmla="val 215656"/>
             </a:avLst>
           </a:prstGeom>
           <a:ln w="19050">

</xml_diff>

<commit_message>
update diagrams for dev guide storage component (#170)
</commit_message>
<xml_diff>
--- a/docs/diagrams/StorageComponentClassDiagram.pptx
+++ b/docs/diagrams/StorageComponentClassDiagram.pptx
@@ -107,6 +107,22 @@
       </a:defRPr>
     </a:lvl9pPr>
   </p:defaultTextStyle>
+  <p:extLst>
+    <p:ext uri="{EFAFB233-063F-42B5-8137-9DF3F51BA10A}">
+      <p15:sldGuideLst xmlns:p15="http://schemas.microsoft.com/office/powerpoint/2012/main">
+        <p15:guide id="1" orient="horz" pos="1488">
+          <p15:clr>
+            <a:srgbClr val="A4A3A4"/>
+          </p15:clr>
+        </p15:guide>
+        <p15:guide id="2" pos="2880">
+          <p15:clr>
+            <a:srgbClr val="A4A3A4"/>
+          </p15:clr>
+        </p15:guide>
+      </p15:sldGuideLst>
+    </p:ext>
+  </p:extLst>
 </p:presentation>
 </file>
 
@@ -192,7 +208,7 @@
           <a:p>
             <a:fld id="{F5CC4B3F-88C1-4FFA-B1B6-F41C21DC6924}" type="datetimeFigureOut">
               <a:rPr lang="en-US" smtClean="0"/>
-              <a:t>10/16/2016</a:t>
+              <a:t>4/8/2017</a:t>
             </a:fld>
             <a:endParaRPr lang="en-US"/>
           </a:p>
@@ -256,38 +272,37 @@
           <a:p>
             <a:pPr lvl="0"/>
             <a:r>
-              <a:rPr lang="en-US" smtClean="0"/>
+              <a:rPr lang="en-US"/>
               <a:t>Click to edit Master text styles</a:t>
             </a:r>
           </a:p>
           <a:p>
             <a:pPr lvl="1"/>
             <a:r>
-              <a:rPr lang="en-US" smtClean="0"/>
+              <a:rPr lang="en-US"/>
               <a:t>Second level</a:t>
             </a:r>
           </a:p>
           <a:p>
             <a:pPr lvl="2"/>
             <a:r>
-              <a:rPr lang="en-US" smtClean="0"/>
+              <a:rPr lang="en-US"/>
               <a:t>Third level</a:t>
             </a:r>
           </a:p>
           <a:p>
             <a:pPr lvl="3"/>
             <a:r>
-              <a:rPr lang="en-US" smtClean="0"/>
+              <a:rPr lang="en-US"/>
               <a:t>Fourth level</a:t>
             </a:r>
           </a:p>
           <a:p>
             <a:pPr lvl="4"/>
             <a:r>
-              <a:rPr lang="en-US" smtClean="0"/>
+              <a:rPr lang="en-US"/>
               <a:t>Fifth level</a:t>
             </a:r>
-            <a:endParaRPr lang="en-US"/>
           </a:p>
         </p:txBody>
       </p:sp>
@@ -498,10 +513,9 @@
           <a:lstStyle/>
           <a:p>
             <a:r>
-              <a:rPr lang="en-US" smtClean="0"/>
+              <a:rPr lang="en-US"/>
               <a:t>Click to edit Master title style</a:t>
             </a:r>
-            <a:endParaRPr lang="en-US"/>
           </a:p>
         </p:txBody>
       </p:sp>
@@ -617,10 +631,9 @@
           </a:lstStyle>
           <a:p>
             <a:r>
-              <a:rPr lang="en-US" smtClean="0"/>
+              <a:rPr lang="en-US"/>
               <a:t>Click to edit Master subtitle style</a:t>
             </a:r>
-            <a:endParaRPr lang="en-US"/>
           </a:p>
         </p:txBody>
       </p:sp>
@@ -641,7 +654,7 @@
           <a:p>
             <a:fld id="{78C97017-6FC3-485B-9764-EAC9E56C1D49}" type="datetimeFigureOut">
               <a:rPr lang="en-US" smtClean="0"/>
-              <a:t>10/16/2016</a:t>
+              <a:t>4/8/2017</a:t>
             </a:fld>
             <a:endParaRPr lang="en-US"/>
           </a:p>
@@ -735,10 +748,9 @@
           <a:lstStyle/>
           <a:p>
             <a:r>
-              <a:rPr lang="en-US" smtClean="0"/>
+              <a:rPr lang="en-US"/>
               <a:t>Click to edit Master title style</a:t>
             </a:r>
-            <a:endParaRPr lang="en-US"/>
           </a:p>
         </p:txBody>
       </p:sp>
@@ -759,38 +771,37 @@
           <a:p>
             <a:pPr lvl="0"/>
             <a:r>
-              <a:rPr lang="en-US" smtClean="0"/>
+              <a:rPr lang="en-US"/>
               <a:t>Click to edit Master text styles</a:t>
             </a:r>
           </a:p>
           <a:p>
             <a:pPr lvl="1"/>
             <a:r>
-              <a:rPr lang="en-US" smtClean="0"/>
+              <a:rPr lang="en-US"/>
               <a:t>Second level</a:t>
             </a:r>
           </a:p>
           <a:p>
             <a:pPr lvl="2"/>
             <a:r>
-              <a:rPr lang="en-US" smtClean="0"/>
+              <a:rPr lang="en-US"/>
               <a:t>Third level</a:t>
             </a:r>
           </a:p>
           <a:p>
             <a:pPr lvl="3"/>
             <a:r>
-              <a:rPr lang="en-US" smtClean="0"/>
+              <a:rPr lang="en-US"/>
               <a:t>Fourth level</a:t>
             </a:r>
           </a:p>
           <a:p>
             <a:pPr lvl="4"/>
             <a:r>
-              <a:rPr lang="en-US" smtClean="0"/>
+              <a:rPr lang="en-US"/>
               <a:t>Fifth level</a:t>
             </a:r>
-            <a:endParaRPr lang="en-US"/>
           </a:p>
         </p:txBody>
       </p:sp>
@@ -811,7 +822,7 @@
           <a:p>
             <a:fld id="{78C97017-6FC3-485B-9764-EAC9E56C1D49}" type="datetimeFigureOut">
               <a:rPr lang="en-US" smtClean="0"/>
-              <a:t>10/16/2016</a:t>
+              <a:t>4/8/2017</a:t>
             </a:fld>
             <a:endParaRPr lang="en-US"/>
           </a:p>
@@ -910,10 +921,9 @@
           <a:lstStyle/>
           <a:p>
             <a:r>
-              <a:rPr lang="en-US" smtClean="0"/>
+              <a:rPr lang="en-US"/>
               <a:t>Click to edit Master title style</a:t>
             </a:r>
-            <a:endParaRPr lang="en-US"/>
           </a:p>
         </p:txBody>
       </p:sp>
@@ -939,38 +949,37 @@
           <a:p>
             <a:pPr lvl="0"/>
             <a:r>
-              <a:rPr lang="en-US" smtClean="0"/>
+              <a:rPr lang="en-US"/>
               <a:t>Click to edit Master text styles</a:t>
             </a:r>
           </a:p>
           <a:p>
             <a:pPr lvl="1"/>
             <a:r>
-              <a:rPr lang="en-US" smtClean="0"/>
+              <a:rPr lang="en-US"/>
               <a:t>Second level</a:t>
             </a:r>
           </a:p>
           <a:p>
             <a:pPr lvl="2"/>
             <a:r>
-              <a:rPr lang="en-US" smtClean="0"/>
+              <a:rPr lang="en-US"/>
               <a:t>Third level</a:t>
             </a:r>
           </a:p>
           <a:p>
             <a:pPr lvl="3"/>
             <a:r>
-              <a:rPr lang="en-US" smtClean="0"/>
+              <a:rPr lang="en-US"/>
               <a:t>Fourth level</a:t>
             </a:r>
           </a:p>
           <a:p>
             <a:pPr lvl="4"/>
             <a:r>
-              <a:rPr lang="en-US" smtClean="0"/>
+              <a:rPr lang="en-US"/>
               <a:t>Fifth level</a:t>
             </a:r>
-            <a:endParaRPr lang="en-US"/>
           </a:p>
         </p:txBody>
       </p:sp>
@@ -991,7 +1000,7 @@
           <a:p>
             <a:fld id="{78C97017-6FC3-485B-9764-EAC9E56C1D49}" type="datetimeFigureOut">
               <a:rPr lang="en-US" smtClean="0"/>
-              <a:t>10/16/2016</a:t>
+              <a:t>4/8/2017</a:t>
             </a:fld>
             <a:endParaRPr lang="en-US"/>
           </a:p>
@@ -1085,10 +1094,9 @@
           <a:lstStyle/>
           <a:p>
             <a:r>
-              <a:rPr lang="en-US" smtClean="0"/>
+              <a:rPr lang="en-US"/>
               <a:t>Click to edit Master title style</a:t>
             </a:r>
-            <a:endParaRPr lang="en-US"/>
           </a:p>
         </p:txBody>
       </p:sp>
@@ -1109,38 +1117,37 @@
           <a:p>
             <a:pPr lvl="0"/>
             <a:r>
-              <a:rPr lang="en-US" smtClean="0"/>
+              <a:rPr lang="en-US"/>
               <a:t>Click to edit Master text styles</a:t>
             </a:r>
           </a:p>
           <a:p>
             <a:pPr lvl="1"/>
             <a:r>
-              <a:rPr lang="en-US" smtClean="0"/>
+              <a:rPr lang="en-US"/>
               <a:t>Second level</a:t>
             </a:r>
           </a:p>
           <a:p>
             <a:pPr lvl="2"/>
             <a:r>
-              <a:rPr lang="en-US" smtClean="0"/>
+              <a:rPr lang="en-US"/>
               <a:t>Third level</a:t>
             </a:r>
           </a:p>
           <a:p>
             <a:pPr lvl="3"/>
             <a:r>
-              <a:rPr lang="en-US" smtClean="0"/>
+              <a:rPr lang="en-US"/>
               <a:t>Fourth level</a:t>
             </a:r>
           </a:p>
           <a:p>
             <a:pPr lvl="4"/>
             <a:r>
-              <a:rPr lang="en-US" smtClean="0"/>
+              <a:rPr lang="en-US"/>
               <a:t>Fifth level</a:t>
             </a:r>
-            <a:endParaRPr lang="en-US"/>
           </a:p>
         </p:txBody>
       </p:sp>
@@ -1161,7 +1168,7 @@
           <a:p>
             <a:fld id="{78C97017-6FC3-485B-9764-EAC9E56C1D49}" type="datetimeFigureOut">
               <a:rPr lang="en-US" smtClean="0"/>
-              <a:t>10/16/2016</a:t>
+              <a:t>4/8/2017</a:t>
             </a:fld>
             <a:endParaRPr lang="en-US"/>
           </a:p>
@@ -1264,10 +1271,9 @@
           </a:lstStyle>
           <a:p>
             <a:r>
-              <a:rPr lang="en-US" smtClean="0"/>
+              <a:rPr lang="en-US"/>
               <a:t>Click to edit Master title style</a:t>
             </a:r>
-            <a:endParaRPr lang="en-US"/>
           </a:p>
         </p:txBody>
       </p:sp>
@@ -1384,7 +1390,7 @@
           <a:p>
             <a:pPr lvl="0"/>
             <a:r>
-              <a:rPr lang="en-US" smtClean="0"/>
+              <a:rPr lang="en-US"/>
               <a:t>Click to edit Master text styles</a:t>
             </a:r>
           </a:p>
@@ -1407,7 +1413,7 @@
           <a:p>
             <a:fld id="{78C97017-6FC3-485B-9764-EAC9E56C1D49}" type="datetimeFigureOut">
               <a:rPr lang="en-US" smtClean="0"/>
-              <a:t>10/16/2016</a:t>
+              <a:t>4/8/2017</a:t>
             </a:fld>
             <a:endParaRPr lang="en-US"/>
           </a:p>
@@ -1501,10 +1507,9 @@
           <a:lstStyle/>
           <a:p>
             <a:r>
-              <a:rPr lang="en-US" smtClean="0"/>
+              <a:rPr lang="en-US"/>
               <a:t>Click to edit Master title style</a:t>
             </a:r>
-            <a:endParaRPr lang="en-US"/>
           </a:p>
         </p:txBody>
       </p:sp>
@@ -1558,38 +1563,37 @@
           <a:p>
             <a:pPr lvl="0"/>
             <a:r>
-              <a:rPr lang="en-US" smtClean="0"/>
+              <a:rPr lang="en-US"/>
               <a:t>Click to edit Master text styles</a:t>
             </a:r>
           </a:p>
           <a:p>
             <a:pPr lvl="1"/>
             <a:r>
-              <a:rPr lang="en-US" smtClean="0"/>
+              <a:rPr lang="en-US"/>
               <a:t>Second level</a:t>
             </a:r>
           </a:p>
           <a:p>
             <a:pPr lvl="2"/>
             <a:r>
-              <a:rPr lang="en-US" smtClean="0"/>
+              <a:rPr lang="en-US"/>
               <a:t>Third level</a:t>
             </a:r>
           </a:p>
           <a:p>
             <a:pPr lvl="3"/>
             <a:r>
-              <a:rPr lang="en-US" smtClean="0"/>
+              <a:rPr lang="en-US"/>
               <a:t>Fourth level</a:t>
             </a:r>
           </a:p>
           <a:p>
             <a:pPr lvl="4"/>
             <a:r>
-              <a:rPr lang="en-US" smtClean="0"/>
+              <a:rPr lang="en-US"/>
               <a:t>Fifth level</a:t>
             </a:r>
-            <a:endParaRPr lang="en-US"/>
           </a:p>
         </p:txBody>
       </p:sp>
@@ -1643,38 +1647,37 @@
           <a:p>
             <a:pPr lvl="0"/>
             <a:r>
-              <a:rPr lang="en-US" smtClean="0"/>
+              <a:rPr lang="en-US"/>
               <a:t>Click to edit Master text styles</a:t>
             </a:r>
           </a:p>
           <a:p>
             <a:pPr lvl="1"/>
             <a:r>
-              <a:rPr lang="en-US" smtClean="0"/>
+              <a:rPr lang="en-US"/>
               <a:t>Second level</a:t>
             </a:r>
           </a:p>
           <a:p>
             <a:pPr lvl="2"/>
             <a:r>
-              <a:rPr lang="en-US" smtClean="0"/>
+              <a:rPr lang="en-US"/>
               <a:t>Third level</a:t>
             </a:r>
           </a:p>
           <a:p>
             <a:pPr lvl="3"/>
             <a:r>
-              <a:rPr lang="en-US" smtClean="0"/>
+              <a:rPr lang="en-US"/>
               <a:t>Fourth level</a:t>
             </a:r>
           </a:p>
           <a:p>
             <a:pPr lvl="4"/>
             <a:r>
-              <a:rPr lang="en-US" smtClean="0"/>
+              <a:rPr lang="en-US"/>
               <a:t>Fifth level</a:t>
             </a:r>
-            <a:endParaRPr lang="en-US"/>
           </a:p>
         </p:txBody>
       </p:sp>
@@ -1695,7 +1698,7 @@
           <a:p>
             <a:fld id="{78C97017-6FC3-485B-9764-EAC9E56C1D49}" type="datetimeFigureOut">
               <a:rPr lang="en-US" smtClean="0"/>
-              <a:t>10/16/2016</a:t>
+              <a:t>4/8/2017</a:t>
             </a:fld>
             <a:endParaRPr lang="en-US"/>
           </a:p>
@@ -1793,10 +1796,9 @@
           </a:lstStyle>
           <a:p>
             <a:r>
-              <a:rPr lang="en-US" smtClean="0"/>
+              <a:rPr lang="en-US"/>
               <a:t>Click to edit Master title style</a:t>
             </a:r>
-            <a:endParaRPr lang="en-US"/>
           </a:p>
         </p:txBody>
       </p:sp>
@@ -1859,7 +1861,7 @@
           <a:p>
             <a:pPr lvl="0"/>
             <a:r>
-              <a:rPr lang="en-US" smtClean="0"/>
+              <a:rPr lang="en-US"/>
               <a:t>Click to edit Master text styles</a:t>
             </a:r>
           </a:p>
@@ -1915,38 +1917,37 @@
           <a:p>
             <a:pPr lvl="0"/>
             <a:r>
-              <a:rPr lang="en-US" smtClean="0"/>
+              <a:rPr lang="en-US"/>
               <a:t>Click to edit Master text styles</a:t>
             </a:r>
           </a:p>
           <a:p>
             <a:pPr lvl="1"/>
             <a:r>
-              <a:rPr lang="en-US" smtClean="0"/>
+              <a:rPr lang="en-US"/>
               <a:t>Second level</a:t>
             </a:r>
           </a:p>
           <a:p>
             <a:pPr lvl="2"/>
             <a:r>
-              <a:rPr lang="en-US" smtClean="0"/>
+              <a:rPr lang="en-US"/>
               <a:t>Third level</a:t>
             </a:r>
           </a:p>
           <a:p>
             <a:pPr lvl="3"/>
             <a:r>
-              <a:rPr lang="en-US" smtClean="0"/>
+              <a:rPr lang="en-US"/>
               <a:t>Fourth level</a:t>
             </a:r>
           </a:p>
           <a:p>
             <a:pPr lvl="4"/>
             <a:r>
-              <a:rPr lang="en-US" smtClean="0"/>
+              <a:rPr lang="en-US"/>
               <a:t>Fifth level</a:t>
             </a:r>
-            <a:endParaRPr lang="en-US"/>
           </a:p>
         </p:txBody>
       </p:sp>
@@ -2009,7 +2010,7 @@
           <a:p>
             <a:pPr lvl="0"/>
             <a:r>
-              <a:rPr lang="en-US" smtClean="0"/>
+              <a:rPr lang="en-US"/>
               <a:t>Click to edit Master text styles</a:t>
             </a:r>
           </a:p>
@@ -2065,38 +2066,37 @@
           <a:p>
             <a:pPr lvl="0"/>
             <a:r>
-              <a:rPr lang="en-US" smtClean="0"/>
+              <a:rPr lang="en-US"/>
               <a:t>Click to edit Master text styles</a:t>
             </a:r>
           </a:p>
           <a:p>
             <a:pPr lvl="1"/>
             <a:r>
-              <a:rPr lang="en-US" smtClean="0"/>
+              <a:rPr lang="en-US"/>
               <a:t>Second level</a:t>
             </a:r>
           </a:p>
           <a:p>
             <a:pPr lvl="2"/>
             <a:r>
-              <a:rPr lang="en-US" smtClean="0"/>
+              <a:rPr lang="en-US"/>
               <a:t>Third level</a:t>
             </a:r>
           </a:p>
           <a:p>
             <a:pPr lvl="3"/>
             <a:r>
-              <a:rPr lang="en-US" smtClean="0"/>
+              <a:rPr lang="en-US"/>
               <a:t>Fourth level</a:t>
             </a:r>
           </a:p>
           <a:p>
             <a:pPr lvl="4"/>
             <a:r>
-              <a:rPr lang="en-US" smtClean="0"/>
+              <a:rPr lang="en-US"/>
               <a:t>Fifth level</a:t>
             </a:r>
-            <a:endParaRPr lang="en-US"/>
           </a:p>
         </p:txBody>
       </p:sp>
@@ -2117,7 +2117,7 @@
           <a:p>
             <a:fld id="{78C97017-6FC3-485B-9764-EAC9E56C1D49}" type="datetimeFigureOut">
               <a:rPr lang="en-US" smtClean="0"/>
-              <a:t>10/16/2016</a:t>
+              <a:t>4/8/2017</a:t>
             </a:fld>
             <a:endParaRPr lang="en-US"/>
           </a:p>
@@ -2211,10 +2211,9 @@
           <a:lstStyle/>
           <a:p>
             <a:r>
-              <a:rPr lang="en-US" smtClean="0"/>
+              <a:rPr lang="en-US"/>
               <a:t>Click to edit Master title style</a:t>
             </a:r>
-            <a:endParaRPr lang="en-US"/>
           </a:p>
         </p:txBody>
       </p:sp>
@@ -2235,7 +2234,7 @@
           <a:p>
             <a:fld id="{78C97017-6FC3-485B-9764-EAC9E56C1D49}" type="datetimeFigureOut">
               <a:rPr lang="en-US" smtClean="0"/>
-              <a:t>10/16/2016</a:t>
+              <a:t>4/8/2017</a:t>
             </a:fld>
             <a:endParaRPr lang="en-US"/>
           </a:p>
@@ -2330,7 +2329,7 @@
           <a:p>
             <a:fld id="{78C97017-6FC3-485B-9764-EAC9E56C1D49}" type="datetimeFigureOut">
               <a:rPr lang="en-US" smtClean="0"/>
-              <a:t>10/16/2016</a:t>
+              <a:t>4/8/2017</a:t>
             </a:fld>
             <a:endParaRPr lang="en-US"/>
           </a:p>
@@ -2433,10 +2432,9 @@
           </a:lstStyle>
           <a:p>
             <a:r>
-              <a:rPr lang="en-US" smtClean="0"/>
+              <a:rPr lang="en-US"/>
               <a:t>Click to edit Master title style</a:t>
             </a:r>
-            <a:endParaRPr lang="en-US"/>
           </a:p>
         </p:txBody>
       </p:sp>
@@ -2490,38 +2488,37 @@
           <a:p>
             <a:pPr lvl="0"/>
             <a:r>
-              <a:rPr lang="en-US" smtClean="0"/>
+              <a:rPr lang="en-US"/>
               <a:t>Click to edit Master text styles</a:t>
             </a:r>
           </a:p>
           <a:p>
             <a:pPr lvl="1"/>
             <a:r>
-              <a:rPr lang="en-US" smtClean="0"/>
+              <a:rPr lang="en-US"/>
               <a:t>Second level</a:t>
             </a:r>
           </a:p>
           <a:p>
             <a:pPr lvl="2"/>
             <a:r>
-              <a:rPr lang="en-US" smtClean="0"/>
+              <a:rPr lang="en-US"/>
               <a:t>Third level</a:t>
             </a:r>
           </a:p>
           <a:p>
             <a:pPr lvl="3"/>
             <a:r>
-              <a:rPr lang="en-US" smtClean="0"/>
+              <a:rPr lang="en-US"/>
               <a:t>Fourth level</a:t>
             </a:r>
           </a:p>
           <a:p>
             <a:pPr lvl="4"/>
             <a:r>
-              <a:rPr lang="en-US" smtClean="0"/>
+              <a:rPr lang="en-US"/>
               <a:t>Fifth level</a:t>
             </a:r>
-            <a:endParaRPr lang="en-US"/>
           </a:p>
         </p:txBody>
       </p:sp>
@@ -2584,7 +2581,7 @@
           <a:p>
             <a:pPr lvl="0"/>
             <a:r>
-              <a:rPr lang="en-US" smtClean="0"/>
+              <a:rPr lang="en-US"/>
               <a:t>Click to edit Master text styles</a:t>
             </a:r>
           </a:p>
@@ -2607,7 +2604,7 @@
           <a:p>
             <a:fld id="{78C97017-6FC3-485B-9764-EAC9E56C1D49}" type="datetimeFigureOut">
               <a:rPr lang="en-US" smtClean="0"/>
-              <a:t>10/16/2016</a:t>
+              <a:t>4/8/2017</a:t>
             </a:fld>
             <a:endParaRPr lang="en-US"/>
           </a:p>
@@ -2710,10 +2707,9 @@
           </a:lstStyle>
           <a:p>
             <a:r>
-              <a:rPr lang="en-US" smtClean="0"/>
+              <a:rPr lang="en-US"/>
               <a:t>Click to edit Master title style</a:t>
             </a:r>
-            <a:endParaRPr lang="en-US"/>
           </a:p>
         </p:txBody>
       </p:sp>
@@ -2837,7 +2833,7 @@
           <a:p>
             <a:pPr lvl="0"/>
             <a:r>
-              <a:rPr lang="en-US" smtClean="0"/>
+              <a:rPr lang="en-US"/>
               <a:t>Click to edit Master text styles</a:t>
             </a:r>
           </a:p>
@@ -2860,7 +2856,7 @@
           <a:p>
             <a:fld id="{78C97017-6FC3-485B-9764-EAC9E56C1D49}" type="datetimeFigureOut">
               <a:rPr lang="en-US" smtClean="0"/>
-              <a:t>10/16/2016</a:t>
+              <a:t>4/8/2017</a:t>
             </a:fld>
             <a:endParaRPr lang="en-US"/>
           </a:p>
@@ -2969,10 +2965,9 @@
           <a:lstStyle/>
           <a:p>
             <a:r>
-              <a:rPr lang="en-US" smtClean="0"/>
+              <a:rPr lang="en-US"/>
               <a:t>Click to edit Master title style</a:t>
             </a:r>
-            <a:endParaRPr lang="en-US"/>
           </a:p>
         </p:txBody>
       </p:sp>
@@ -3003,38 +2998,37 @@
           <a:p>
             <a:pPr lvl="0"/>
             <a:r>
-              <a:rPr lang="en-US" smtClean="0"/>
+              <a:rPr lang="en-US"/>
               <a:t>Click to edit Master text styles</a:t>
             </a:r>
           </a:p>
           <a:p>
             <a:pPr lvl="1"/>
             <a:r>
-              <a:rPr lang="en-US" smtClean="0"/>
+              <a:rPr lang="en-US"/>
               <a:t>Second level</a:t>
             </a:r>
           </a:p>
           <a:p>
             <a:pPr lvl="2"/>
             <a:r>
-              <a:rPr lang="en-US" smtClean="0"/>
+              <a:rPr lang="en-US"/>
               <a:t>Third level</a:t>
             </a:r>
           </a:p>
           <a:p>
             <a:pPr lvl="3"/>
             <a:r>
-              <a:rPr lang="en-US" smtClean="0"/>
+              <a:rPr lang="en-US"/>
               <a:t>Fourth level</a:t>
             </a:r>
           </a:p>
           <a:p>
             <a:pPr lvl="4"/>
             <a:r>
-              <a:rPr lang="en-US" smtClean="0"/>
+              <a:rPr lang="en-US"/>
               <a:t>Fifth level</a:t>
             </a:r>
-            <a:endParaRPr lang="en-US"/>
           </a:p>
         </p:txBody>
       </p:sp>
@@ -3073,7 +3067,7 @@
           <a:p>
             <a:fld id="{78C97017-6FC3-485B-9764-EAC9E56C1D49}" type="datetimeFigureOut">
               <a:rPr lang="en-US" smtClean="0"/>
-              <a:t>10/16/2016</a:t>
+              <a:t>4/8/2017</a:t>
             </a:fld>
             <a:endParaRPr lang="en-US"/>
           </a:p>
@@ -3494,7 +3488,7 @@
           <a:lstStyle/>
           <a:p>
             <a:r>
-              <a:rPr lang="en-US" sz="1200" b="1" dirty="0" smtClean="0">
+              <a:rPr lang="en-US" sz="1200" b="1" dirty="0">
                 <a:solidFill>
                   <a:schemeClr val="accent6">
                     <a:lumMod val="75000"/>
@@ -3561,7 +3555,7 @@
           <a:p>
             <a:pPr algn="ctr"/>
             <a:r>
-              <a:rPr lang="en-US" sz="1050" dirty="0" smtClean="0">
+              <a:rPr lang="en-US" sz="1050" dirty="0">
                 <a:solidFill>
                   <a:schemeClr val="bg1"/>
                 </a:solidFill>
@@ -3569,19 +3563,27 @@
               <a:t>&lt;&lt;interface&gt;&gt;</a:t>
             </a:r>
             <a:br>
-              <a:rPr lang="en-US" sz="1050" dirty="0" smtClean="0">
+              <a:rPr lang="en-US" sz="1050" dirty="0">
                 <a:solidFill>
                   <a:schemeClr val="bg1"/>
                 </a:solidFill>
               </a:rPr>
             </a:br>
             <a:r>
-              <a:rPr lang="en-US" sz="1050" dirty="0" err="1" smtClean="0">
+              <a:rPr lang="en-US" altLang="zh-CN" sz="1050" dirty="0" err="1">
                 <a:solidFill>
                   <a:schemeClr val="bg1"/>
                 </a:solidFill>
               </a:rPr>
-              <a:t>AddressBookStorage</a:t>
+              <a:t>TaskList</a:t>
+            </a:r>
+            <a:r>
+              <a:rPr lang="en-US" sz="1050" dirty="0" err="1">
+                <a:solidFill>
+                  <a:schemeClr val="bg1"/>
+                </a:solidFill>
+              </a:rPr>
+              <a:t>Storage</a:t>
             </a:r>
             <a:endParaRPr lang="en-SG" sz="1050" dirty="0">
               <a:solidFill>
@@ -3639,7 +3641,7 @@
           <a:p>
             <a:pPr algn="ctr"/>
             <a:r>
-              <a:rPr lang="en-US" sz="1050" dirty="0" err="1" smtClean="0">
+              <a:rPr lang="en-US" sz="1050" dirty="0" err="1">
                 <a:solidFill>
                   <a:schemeClr val="bg1"/>
                 </a:solidFill>
@@ -3713,7 +3715,7 @@
           <a:p>
             <a:pPr algn="ctr"/>
             <a:r>
-              <a:rPr lang="en-US" sz="1050" dirty="0" smtClean="0">
+              <a:rPr lang="en-US" sz="1050" dirty="0">
                 <a:solidFill>
                   <a:schemeClr val="bg1"/>
                 </a:solidFill>
@@ -4147,27 +4149,17 @@
           <a:p>
             <a:pPr algn="ctr"/>
             <a:r>
-              <a:rPr lang="en-US" sz="1050" b="1" dirty="0" err="1" smtClean="0">
+              <a:rPr lang="en-US" sz="1050" b="1" dirty="0" err="1">
                 <a:solidFill>
                   <a:schemeClr val="accent6">
                     <a:lumMod val="75000"/>
                   </a:schemeClr>
                 </a:solidFill>
               </a:rPr>
-              <a:t>XmlAddressBook</a:t>
-            </a:r>
-            <a:r>
-              <a:rPr lang="en-US" sz="1050" b="1" dirty="0" smtClean="0">
-                <a:solidFill>
-                  <a:schemeClr val="accent6">
-                    <a:lumMod val="75000"/>
-                  </a:schemeClr>
-                </a:solidFill>
-              </a:rPr>
-              <a:t/>
+              <a:t>XmlTaskList</a:t>
             </a:r>
             <a:br>
-              <a:rPr lang="en-US" sz="1050" b="1" dirty="0" smtClean="0">
+              <a:rPr lang="en-US" sz="1050" b="1" dirty="0">
                 <a:solidFill>
                   <a:schemeClr val="accent6">
                     <a:lumMod val="75000"/>
@@ -4176,7 +4168,7 @@
               </a:rPr>
             </a:br>
             <a:r>
-              <a:rPr lang="en-US" sz="1050" b="1" dirty="0" smtClean="0">
+              <a:rPr lang="en-US" sz="1050" b="1" dirty="0">
                 <a:solidFill>
                   <a:schemeClr val="accent6">
                     <a:lumMod val="75000"/>
@@ -4243,7 +4235,7 @@
           <a:p>
             <a:pPr algn="ctr"/>
             <a:r>
-              <a:rPr lang="en-US" sz="1050" dirty="0" smtClean="0">
+              <a:rPr lang="en-US" sz="1050" dirty="0">
                 <a:solidFill>
                   <a:schemeClr val="bg1"/>
                 </a:solidFill>
@@ -4251,14 +4243,14 @@
               <a:t>&lt;&lt;interface&gt;&gt;</a:t>
             </a:r>
             <a:br>
-              <a:rPr lang="en-US" sz="1050" dirty="0" smtClean="0">
+              <a:rPr lang="en-US" sz="1050" dirty="0">
                 <a:solidFill>
                   <a:schemeClr val="bg1"/>
                 </a:solidFill>
               </a:rPr>
             </a:br>
             <a:r>
-              <a:rPr lang="en-US" sz="1050" dirty="0" err="1" smtClean="0">
+              <a:rPr lang="en-US" sz="1050" dirty="0" err="1">
                 <a:solidFill>
                   <a:schemeClr val="bg1"/>
                 </a:solidFill>
@@ -4516,30 +4508,22 @@
           <a:p>
             <a:pPr algn="ctr"/>
             <a:r>
-              <a:rPr lang="en-US" sz="1050" dirty="0" err="1" smtClean="0">
+              <a:rPr lang="en-US" sz="1050" dirty="0" err="1">
                 <a:solidFill>
                   <a:schemeClr val="bg1"/>
                 </a:solidFill>
               </a:rPr>
               <a:t>JsonUserPrefs</a:t>
             </a:r>
-            <a:r>
-              <a:rPr lang="en-US" sz="1050" dirty="0" smtClean="0">
-                <a:solidFill>
-                  <a:schemeClr val="bg1"/>
-                </a:solidFill>
-              </a:rPr>
-              <a:t/>
-            </a:r>
             <a:br>
-              <a:rPr lang="en-US" sz="1050" dirty="0" smtClean="0">
+              <a:rPr lang="en-US" sz="1050" dirty="0">
                 <a:solidFill>
                   <a:schemeClr val="bg1"/>
                 </a:solidFill>
               </a:rPr>
             </a:br>
             <a:r>
-              <a:rPr lang="en-US" sz="1050" dirty="0" smtClean="0">
+              <a:rPr lang="en-US" sz="1050" dirty="0">
                 <a:solidFill>
                   <a:schemeClr val="bg1"/>
                 </a:solidFill>
@@ -4591,7 +4575,7 @@
           <a:p>
             <a:pPr algn="ctr"/>
             <a:r>
-              <a:rPr lang="en-US" sz="1050" b="1" dirty="0" err="1" smtClean="0">
+              <a:rPr lang="en-US" sz="1050" b="1" dirty="0" err="1">
                 <a:solidFill>
                   <a:schemeClr val="accent6">
                     <a:lumMod val="75000"/>
@@ -4600,18 +4584,8 @@
               </a:rPr>
               <a:t>XmlSerializable</a:t>
             </a:r>
-            <a:r>
-              <a:rPr lang="en-US" sz="1050" b="1" dirty="0" smtClean="0">
-                <a:solidFill>
-                  <a:schemeClr val="accent6">
-                    <a:lumMod val="75000"/>
-                  </a:schemeClr>
-                </a:solidFill>
-              </a:rPr>
-              <a:t/>
-            </a:r>
             <a:br>
-              <a:rPr lang="en-US" sz="1050" b="1" dirty="0" smtClean="0">
+              <a:rPr lang="en-US" sz="1050" b="1" dirty="0">
                 <a:solidFill>
                   <a:schemeClr val="accent6">
                     <a:lumMod val="75000"/>
@@ -4620,14 +4594,14 @@
               </a:rPr>
             </a:br>
             <a:r>
-              <a:rPr lang="en-US" sz="1050" b="1" dirty="0" err="1" smtClean="0">
+              <a:rPr lang="en-US" sz="1050" b="1" dirty="0" err="1">
                 <a:solidFill>
                   <a:schemeClr val="accent6">
                     <a:lumMod val="75000"/>
                   </a:schemeClr>
                 </a:solidFill>
               </a:rPr>
-              <a:t>AddressBook</a:t>
+              <a:t>TaskList</a:t>
             </a:r>
             <a:endParaRPr lang="en-SG" sz="1050" b="1" dirty="0">
               <a:solidFill>
@@ -4717,7 +4691,7 @@
           <a:p>
             <a:pPr algn="ctr"/>
             <a:r>
-              <a:rPr lang="en-US" sz="1050" b="1" dirty="0" err="1" smtClean="0">
+              <a:rPr lang="en-US" sz="1050" b="1" dirty="0" err="1">
                 <a:solidFill>
                   <a:schemeClr val="accent6">
                     <a:lumMod val="75000"/>
@@ -4773,14 +4747,14 @@
           <a:p>
             <a:pPr algn="ctr"/>
             <a:r>
-              <a:rPr lang="en-US" sz="1050" b="1" dirty="0" err="1" smtClean="0">
+              <a:rPr lang="en-US" sz="1050" b="1" dirty="0" err="1">
                 <a:solidFill>
                   <a:schemeClr val="accent6">
                     <a:lumMod val="75000"/>
                   </a:schemeClr>
                 </a:solidFill>
               </a:rPr>
-              <a:t>XmlAdaptedPerson</a:t>
+              <a:t>XmlAdaptedTask</a:t>
             </a:r>
             <a:endParaRPr lang="en-SG" sz="1050" b="1" dirty="0">
               <a:solidFill>
@@ -4843,13 +4817,6 @@
   <p:clrMapOvr>
     <a:masterClrMapping/>
   </p:clrMapOvr>
-  <p:timing>
-    <p:tnLst>
-      <p:par>
-        <p:cTn id="1" dur="indefinite" restart="never" nodeType="tmRoot"/>
-      </p:par>
-    </p:tnLst>
-  </p:timing>
 </p:sld>
 </file>
 

</xml_diff>

<commit_message>
Apply Facade principle to UserConfigStorage component of Storage 	- Hide it behind StorageManager class
</commit_message>
<xml_diff>
--- a/docs/diagrams/StorageComponentClassDiagram.pptx
+++ b/docs/diagrams/StorageComponentClassDiagram.pptx
@@ -208,7 +208,7 @@
           <a:p>
             <a:fld id="{F5CC4B3F-88C1-4FFA-B1B6-F41C21DC6924}" type="datetimeFigureOut">
               <a:rPr lang="en-US" smtClean="0"/>
-              <a:t>4/3/17</a:t>
+              <a:t>4/8/17</a:t>
             </a:fld>
             <a:endParaRPr lang="en-US"/>
           </a:p>
@@ -654,7 +654,7 @@
           <a:p>
             <a:fld id="{78C97017-6FC3-485B-9764-EAC9E56C1D49}" type="datetimeFigureOut">
               <a:rPr lang="en-US" smtClean="0"/>
-              <a:t>4/3/17</a:t>
+              <a:t>4/8/17</a:t>
             </a:fld>
             <a:endParaRPr lang="en-US"/>
           </a:p>
@@ -822,7 +822,7 @@
           <a:p>
             <a:fld id="{78C97017-6FC3-485B-9764-EAC9E56C1D49}" type="datetimeFigureOut">
               <a:rPr lang="en-US" smtClean="0"/>
-              <a:t>4/3/17</a:t>
+              <a:t>4/8/17</a:t>
             </a:fld>
             <a:endParaRPr lang="en-US"/>
           </a:p>
@@ -1000,7 +1000,7 @@
           <a:p>
             <a:fld id="{78C97017-6FC3-485B-9764-EAC9E56C1D49}" type="datetimeFigureOut">
               <a:rPr lang="en-US" smtClean="0"/>
-              <a:t>4/3/17</a:t>
+              <a:t>4/8/17</a:t>
             </a:fld>
             <a:endParaRPr lang="en-US"/>
           </a:p>
@@ -1168,7 +1168,7 @@
           <a:p>
             <a:fld id="{78C97017-6FC3-485B-9764-EAC9E56C1D49}" type="datetimeFigureOut">
               <a:rPr lang="en-US" smtClean="0"/>
-              <a:t>4/3/17</a:t>
+              <a:t>4/8/17</a:t>
             </a:fld>
             <a:endParaRPr lang="en-US"/>
           </a:p>
@@ -1413,7 +1413,7 @@
           <a:p>
             <a:fld id="{78C97017-6FC3-485B-9764-EAC9E56C1D49}" type="datetimeFigureOut">
               <a:rPr lang="en-US" smtClean="0"/>
-              <a:t>4/3/17</a:t>
+              <a:t>4/8/17</a:t>
             </a:fld>
             <a:endParaRPr lang="en-US"/>
           </a:p>
@@ -1698,7 +1698,7 @@
           <a:p>
             <a:fld id="{78C97017-6FC3-485B-9764-EAC9E56C1D49}" type="datetimeFigureOut">
               <a:rPr lang="en-US" smtClean="0"/>
-              <a:t>4/3/17</a:t>
+              <a:t>4/8/17</a:t>
             </a:fld>
             <a:endParaRPr lang="en-US"/>
           </a:p>
@@ -2117,7 +2117,7 @@
           <a:p>
             <a:fld id="{78C97017-6FC3-485B-9764-EAC9E56C1D49}" type="datetimeFigureOut">
               <a:rPr lang="en-US" smtClean="0"/>
-              <a:t>4/3/17</a:t>
+              <a:t>4/8/17</a:t>
             </a:fld>
             <a:endParaRPr lang="en-US"/>
           </a:p>
@@ -2234,7 +2234,7 @@
           <a:p>
             <a:fld id="{78C97017-6FC3-485B-9764-EAC9E56C1D49}" type="datetimeFigureOut">
               <a:rPr lang="en-US" smtClean="0"/>
-              <a:t>4/3/17</a:t>
+              <a:t>4/8/17</a:t>
             </a:fld>
             <a:endParaRPr lang="en-US"/>
           </a:p>
@@ -2329,7 +2329,7 @@
           <a:p>
             <a:fld id="{78C97017-6FC3-485B-9764-EAC9E56C1D49}" type="datetimeFigureOut">
               <a:rPr lang="en-US" smtClean="0"/>
-              <a:t>4/3/17</a:t>
+              <a:t>4/8/17</a:t>
             </a:fld>
             <a:endParaRPr lang="en-US"/>
           </a:p>
@@ -2604,7 +2604,7 @@
           <a:p>
             <a:fld id="{78C97017-6FC3-485B-9764-EAC9E56C1D49}" type="datetimeFigureOut">
               <a:rPr lang="en-US" smtClean="0"/>
-              <a:t>4/3/17</a:t>
+              <a:t>4/8/17</a:t>
             </a:fld>
             <a:endParaRPr lang="en-US"/>
           </a:p>
@@ -2856,7 +2856,7 @@
           <a:p>
             <a:fld id="{78C97017-6FC3-485B-9764-EAC9E56C1D49}" type="datetimeFigureOut">
               <a:rPr lang="en-US" smtClean="0"/>
-              <a:t>4/3/17</a:t>
+              <a:t>4/8/17</a:t>
             </a:fld>
             <a:endParaRPr lang="en-US"/>
           </a:p>
@@ -3067,7 +3067,7 @@
           <a:p>
             <a:fld id="{78C97017-6FC3-485B-9764-EAC9E56C1D49}" type="datetimeFigureOut">
               <a:rPr lang="en-US" smtClean="0"/>
-              <a:t>4/3/17</a:t>
+              <a:t>4/8/17</a:t>
             </a:fld>
             <a:endParaRPr lang="en-US"/>
           </a:p>
@@ -3450,7 +3450,7 @@
         </p:nvSpPr>
         <p:spPr>
           <a:xfrm>
-            <a:off x="1119865" y="2086382"/>
+            <a:off x="1119865" y="2103798"/>
             <a:ext cx="7871735" cy="1723618"/>
           </a:xfrm>
           <a:prstGeom prst="roundRect">
@@ -3593,8 +3593,8 @@
         </p:nvSpPr>
         <p:spPr>
           <a:xfrm rot="16200000">
-            <a:off x="1683963" y="2868687"/>
-            <a:ext cx="1093635" cy="346760"/>
+            <a:off x="1491725" y="2775476"/>
+            <a:ext cx="1478111" cy="346760"/>
           </a:xfrm>
           <a:prstGeom prst="rect">
             <a:avLst/>
@@ -4197,7 +4197,7 @@
         </p:nvSpPr>
         <p:spPr>
           <a:xfrm>
-            <a:off x="2873943" y="2558040"/>
+            <a:off x="2874109" y="2673546"/>
             <a:ext cx="1323049" cy="346760"/>
           </a:xfrm>
           <a:prstGeom prst="rect">
@@ -4278,8 +4278,8 @@
         </p:nvCxnSpPr>
         <p:spPr>
           <a:xfrm>
-            <a:off x="2653133" y="2726136"/>
-            <a:ext cx="220810" cy="5284"/>
+            <a:off x="2645373" y="2843072"/>
+            <a:ext cx="228736" cy="3854"/>
           </a:xfrm>
           <a:prstGeom prst="straightConnector1">
             <a:avLst/>
@@ -4318,7 +4318,7 @@
         </p:nvSpPr>
         <p:spPr>
           <a:xfrm>
-            <a:off x="2417085" y="2639446"/>
+            <a:off x="2409325" y="2756382"/>
             <a:ext cx="236048" cy="173380"/>
           </a:xfrm>
           <a:prstGeom prst="flowChartDecision">
@@ -4372,8 +4372,8 @@
         </p:nvCxnSpPr>
         <p:spPr>
           <a:xfrm flipV="1">
-            <a:off x="4394804" y="2731420"/>
-            <a:ext cx="223324" cy="1"/>
+            <a:off x="4404760" y="2874620"/>
+            <a:ext cx="213368" cy="1"/>
           </a:xfrm>
           <a:prstGeom prst="bentConnector3">
             <a:avLst>
@@ -4415,7 +4415,7 @@
         </p:nvSpPr>
         <p:spPr>
           <a:xfrm rot="5400000" flipV="1">
-            <a:off x="4171790" y="2643659"/>
+            <a:off x="4181746" y="2786859"/>
             <a:ext cx="270504" cy="175523"/>
           </a:xfrm>
           <a:prstGeom prst="triangle">
@@ -4470,7 +4470,7 @@
         </p:nvSpPr>
         <p:spPr>
           <a:xfrm>
-            <a:off x="4618128" y="2558040"/>
+            <a:off x="4618128" y="2701240"/>
             <a:ext cx="1093635" cy="346760"/>
           </a:xfrm>
           <a:prstGeom prst="rect">
@@ -4974,6 +4974,359 @@
           </a:fontRef>
         </p:style>
       </p:cxnSp>
+      <p:sp>
+        <p:nvSpPr>
+          <p:cNvPr id="38" name="Rectangle 8"/>
+          <p:cNvSpPr/>
+          <p:nvPr/>
+        </p:nvSpPr>
+        <p:spPr>
+          <a:xfrm>
+            <a:off x="4648200" y="2209800"/>
+            <a:ext cx="1093635" cy="346760"/>
+          </a:xfrm>
+          <a:prstGeom prst="rect">
+            <a:avLst/>
+          </a:prstGeom>
+          <a:solidFill>
+            <a:schemeClr val="accent6">
+              <a:lumMod val="75000"/>
+            </a:schemeClr>
+          </a:solidFill>
+          <a:ln w="19050">
+            <a:solidFill>
+              <a:schemeClr val="accent6">
+                <a:lumMod val="75000"/>
+              </a:schemeClr>
+            </a:solidFill>
+          </a:ln>
+          <a:effectLst/>
+        </p:spPr>
+        <p:style>
+          <a:lnRef idx="1">
+            <a:schemeClr val="accent2"/>
+          </a:lnRef>
+          <a:fillRef idx="2">
+            <a:schemeClr val="accent2"/>
+          </a:fillRef>
+          <a:effectRef idx="1">
+            <a:schemeClr val="accent2"/>
+          </a:effectRef>
+          <a:fontRef idx="minor">
+            <a:schemeClr val="dk1"/>
+          </a:fontRef>
+        </p:style>
+        <p:txBody>
+          <a:bodyPr rtlCol="0" anchor="ctr"/>
+          <a:lstStyle/>
+          <a:p>
+            <a:pPr algn="ctr"/>
+            <a:r>
+              <a:rPr lang="en-US" sz="1050" dirty="0" err="1" smtClean="0">
+                <a:solidFill>
+                  <a:schemeClr val="bg1"/>
+                </a:solidFill>
+              </a:rPr>
+              <a:t>JsonUserConfig</a:t>
+            </a:r>
+            <a:r>
+              <a:rPr lang="en-US" sz="1050" dirty="0">
+                <a:solidFill>
+                  <a:schemeClr val="bg1"/>
+                </a:solidFill>
+              </a:rPr>
+              <a:t/>
+            </a:r>
+            <a:br>
+              <a:rPr lang="en-US" sz="1050" dirty="0">
+                <a:solidFill>
+                  <a:schemeClr val="bg1"/>
+                </a:solidFill>
+              </a:rPr>
+            </a:br>
+            <a:r>
+              <a:rPr lang="en-US" sz="1050" dirty="0">
+                <a:solidFill>
+                  <a:schemeClr val="bg1"/>
+                </a:solidFill>
+              </a:rPr>
+              <a:t>Storage</a:t>
+            </a:r>
+            <a:endParaRPr lang="en-SG" sz="1050" dirty="0">
+              <a:solidFill>
+                <a:schemeClr val="bg1"/>
+              </a:solidFill>
+            </a:endParaRPr>
+          </a:p>
+        </p:txBody>
+      </p:sp>
+      <p:sp>
+        <p:nvSpPr>
+          <p:cNvPr id="41" name="Flowchart: Decision 96"/>
+          <p:cNvSpPr/>
+          <p:nvPr/>
+        </p:nvSpPr>
+        <p:spPr>
+          <a:xfrm>
+            <a:off x="2430952" y="2286000"/>
+            <a:ext cx="236048" cy="173380"/>
+          </a:xfrm>
+          <a:prstGeom prst="flowChartDecision">
+            <a:avLst/>
+          </a:prstGeom>
+          <a:noFill/>
+          <a:ln w="19050">
+            <a:solidFill>
+              <a:schemeClr val="accent6">
+                <a:lumMod val="75000"/>
+              </a:schemeClr>
+            </a:solidFill>
+          </a:ln>
+          <a:effectLst/>
+        </p:spPr>
+        <p:style>
+          <a:lnRef idx="1">
+            <a:schemeClr val="accent2"/>
+          </a:lnRef>
+          <a:fillRef idx="2">
+            <a:schemeClr val="accent2"/>
+          </a:fillRef>
+          <a:effectRef idx="1">
+            <a:schemeClr val="accent2"/>
+          </a:effectRef>
+          <a:fontRef idx="minor">
+            <a:schemeClr val="dk1"/>
+          </a:fontRef>
+        </p:style>
+        <p:txBody>
+          <a:bodyPr rtlCol="0" anchor="ctr"/>
+          <a:lstStyle/>
+          <a:p>
+            <a:pPr algn="ctr"/>
+            <a:endParaRPr lang="en-US" sz="1050">
+              <a:solidFill>
+                <a:schemeClr val="bg1"/>
+              </a:solidFill>
+            </a:endParaRPr>
+          </a:p>
+        </p:txBody>
+      </p:sp>
+      <p:cxnSp>
+        <p:nvCxnSpPr>
+          <p:cNvPr id="43" name="Straight Arrow Connector 42"/>
+          <p:cNvCxnSpPr/>
+          <p:nvPr/>
+        </p:nvCxnSpPr>
+        <p:spPr>
+          <a:xfrm>
+            <a:off x="2647942" y="2374183"/>
+            <a:ext cx="228736" cy="3854"/>
+          </a:xfrm>
+          <a:prstGeom prst="straightConnector1">
+            <a:avLst/>
+          </a:prstGeom>
+          <a:ln w="19050">
+            <a:solidFill>
+              <a:schemeClr val="accent6">
+                <a:lumMod val="75000"/>
+              </a:schemeClr>
+            </a:solidFill>
+            <a:headEnd type="none" w="med" len="med"/>
+            <a:tailEnd type="arrow" w="med" len="med"/>
+          </a:ln>
+          <a:effectLst/>
+        </p:spPr>
+        <p:style>
+          <a:lnRef idx="1">
+            <a:schemeClr val="accent2"/>
+          </a:lnRef>
+          <a:fillRef idx="2">
+            <a:schemeClr val="accent2"/>
+          </a:fillRef>
+          <a:effectRef idx="1">
+            <a:schemeClr val="accent2"/>
+          </a:effectRef>
+          <a:fontRef idx="minor">
+            <a:schemeClr val="dk1"/>
+          </a:fontRef>
+        </p:style>
+      </p:cxnSp>
+      <p:sp>
+        <p:nvSpPr>
+          <p:cNvPr id="45" name="Rectangle 8"/>
+          <p:cNvSpPr/>
+          <p:nvPr/>
+        </p:nvSpPr>
+        <p:spPr>
+          <a:xfrm>
+            <a:off x="2877409" y="2206584"/>
+            <a:ext cx="1323049" cy="346760"/>
+          </a:xfrm>
+          <a:prstGeom prst="rect">
+            <a:avLst/>
+          </a:prstGeom>
+          <a:solidFill>
+            <a:schemeClr val="accent6">
+              <a:lumMod val="75000"/>
+            </a:schemeClr>
+          </a:solidFill>
+          <a:ln w="19050">
+            <a:solidFill>
+              <a:schemeClr val="accent6">
+                <a:lumMod val="75000"/>
+              </a:schemeClr>
+            </a:solidFill>
+          </a:ln>
+          <a:effectLst/>
+        </p:spPr>
+        <p:style>
+          <a:lnRef idx="1">
+            <a:schemeClr val="accent2"/>
+          </a:lnRef>
+          <a:fillRef idx="2">
+            <a:schemeClr val="accent2"/>
+          </a:fillRef>
+          <a:effectRef idx="1">
+            <a:schemeClr val="accent2"/>
+          </a:effectRef>
+          <a:fontRef idx="minor">
+            <a:schemeClr val="dk1"/>
+          </a:fontRef>
+        </p:style>
+        <p:txBody>
+          <a:bodyPr rtlCol="0" anchor="ctr"/>
+          <a:lstStyle/>
+          <a:p>
+            <a:pPr algn="ctr"/>
+            <a:r>
+              <a:rPr lang="en-US" sz="1050" dirty="0">
+                <a:solidFill>
+                  <a:schemeClr val="bg1"/>
+                </a:solidFill>
+              </a:rPr>
+              <a:t>&lt;&lt;interface&gt;&gt;</a:t>
+            </a:r>
+            <a:br>
+              <a:rPr lang="en-US" sz="1050" dirty="0">
+                <a:solidFill>
+                  <a:schemeClr val="bg1"/>
+                </a:solidFill>
+              </a:rPr>
+            </a:br>
+            <a:r>
+              <a:rPr lang="en-US" sz="1050" dirty="0" err="1" smtClean="0">
+                <a:solidFill>
+                  <a:schemeClr val="bg1"/>
+                </a:solidFill>
+              </a:rPr>
+              <a:t>UserConfigStorage</a:t>
+            </a:r>
+            <a:endParaRPr lang="en-SG" sz="1050" dirty="0">
+              <a:solidFill>
+                <a:schemeClr val="bg1"/>
+              </a:solidFill>
+            </a:endParaRPr>
+          </a:p>
+        </p:txBody>
+      </p:sp>
+      <p:sp>
+        <p:nvSpPr>
+          <p:cNvPr id="46" name="Isosceles Triangle 102"/>
+          <p:cNvSpPr/>
+          <p:nvPr/>
+        </p:nvSpPr>
+        <p:spPr>
+          <a:xfrm rot="5400000" flipV="1">
+            <a:off x="4161612" y="2292203"/>
+            <a:ext cx="270504" cy="175523"/>
+          </a:xfrm>
+          <a:prstGeom prst="triangle">
+            <a:avLst/>
+          </a:prstGeom>
+          <a:solidFill>
+            <a:schemeClr val="accent6">
+              <a:lumMod val="75000"/>
+            </a:schemeClr>
+          </a:solidFill>
+          <a:ln w="19050">
+            <a:solidFill>
+              <a:schemeClr val="accent6">
+                <a:lumMod val="75000"/>
+              </a:schemeClr>
+            </a:solidFill>
+          </a:ln>
+          <a:effectLst/>
+        </p:spPr>
+        <p:style>
+          <a:lnRef idx="1">
+            <a:schemeClr val="accent2"/>
+          </a:lnRef>
+          <a:fillRef idx="2">
+            <a:schemeClr val="accent2"/>
+          </a:fillRef>
+          <a:effectRef idx="1">
+            <a:schemeClr val="accent2"/>
+          </a:effectRef>
+          <a:fontRef idx="minor">
+            <a:schemeClr val="dk1"/>
+          </a:fontRef>
+        </p:style>
+        <p:txBody>
+          <a:bodyPr rtlCol="0" anchor="ctr"/>
+          <a:lstStyle/>
+          <a:p>
+            <a:pPr algn="ctr"/>
+            <a:endParaRPr lang="en-SG" sz="1050">
+              <a:solidFill>
+                <a:schemeClr val="bg1"/>
+              </a:solidFill>
+            </a:endParaRPr>
+          </a:p>
+        </p:txBody>
+      </p:sp>
+      <p:cxnSp>
+        <p:nvCxnSpPr>
+          <p:cNvPr id="47" name="Elbow Connector 63"/>
+          <p:cNvCxnSpPr/>
+          <p:nvPr/>
+        </p:nvCxnSpPr>
+        <p:spPr>
+          <a:xfrm flipV="1">
+            <a:off x="4434832" y="2396441"/>
+            <a:ext cx="213368" cy="1"/>
+          </a:xfrm>
+          <a:prstGeom prst="bentConnector3">
+            <a:avLst>
+              <a:gd name="adj1" fmla="val -19384"/>
+            </a:avLst>
+          </a:prstGeom>
+          <a:ln w="19050">
+            <a:solidFill>
+              <a:schemeClr val="accent6">
+                <a:lumMod val="75000"/>
+              </a:schemeClr>
+            </a:solidFill>
+            <a:prstDash val="sysDot"/>
+            <a:headEnd type="none" w="med" len="med"/>
+            <a:tailEnd type="none" w="med" len="med"/>
+          </a:ln>
+          <a:effectLst/>
+        </p:spPr>
+        <p:style>
+          <a:lnRef idx="1">
+            <a:schemeClr val="accent2"/>
+          </a:lnRef>
+          <a:fillRef idx="2">
+            <a:schemeClr val="accent2"/>
+          </a:fillRef>
+          <a:effectRef idx="1">
+            <a:schemeClr val="accent2"/>
+          </a:effectRef>
+          <a:fontRef idx="minor">
+            <a:schemeClr val="dk1"/>
+          </a:fontRef>
+        </p:style>
+      </p:cxnSp>
     </p:spTree>
     <p:extLst>
       <p:ext uri="{BB962C8B-B14F-4D97-AF65-F5344CB8AC3E}">
@@ -4984,6 +5337,13 @@
   <p:clrMapOvr>
     <a:masterClrMapping/>
   </p:clrMapOvr>
+  <p:timing>
+    <p:tnLst>
+      <p:par>
+        <p:cTn id="1" dur="indefinite" restart="never" nodeType="tmRoot"/>
+      </p:par>
+    </p:tnLst>
+  </p:timing>
 </p:sld>
 </file>
 

</xml_diff>

<commit_message>
Update StorageComponentClassDiagram.pptx to match png
</commit_message>
<xml_diff>
--- a/docs/diagrams/StorageComponentClassDiagram.pptx
+++ b/docs/diagrams/StorageComponentClassDiagram.pptx
@@ -192,7 +192,7 @@
           <a:p>
             <a:fld id="{F5CC4B3F-88C1-4FFA-B1B6-F41C21DC6924}" type="datetimeFigureOut">
               <a:rPr lang="en-US" smtClean="0"/>
-              <a:t>10/16/2016</a:t>
+              <a:t>17-04-09</a:t>
             </a:fld>
             <a:endParaRPr lang="en-US"/>
           </a:p>
@@ -641,7 +641,7 @@
           <a:p>
             <a:fld id="{78C97017-6FC3-485B-9764-EAC9E56C1D49}" type="datetimeFigureOut">
               <a:rPr lang="en-US" smtClean="0"/>
-              <a:t>10/16/2016</a:t>
+              <a:t>17-04-09</a:t>
             </a:fld>
             <a:endParaRPr lang="en-US"/>
           </a:p>
@@ -811,7 +811,7 @@
           <a:p>
             <a:fld id="{78C97017-6FC3-485B-9764-EAC9E56C1D49}" type="datetimeFigureOut">
               <a:rPr lang="en-US" smtClean="0"/>
-              <a:t>10/16/2016</a:t>
+              <a:t>17-04-09</a:t>
             </a:fld>
             <a:endParaRPr lang="en-US"/>
           </a:p>
@@ -991,7 +991,7 @@
           <a:p>
             <a:fld id="{78C97017-6FC3-485B-9764-EAC9E56C1D49}" type="datetimeFigureOut">
               <a:rPr lang="en-US" smtClean="0"/>
-              <a:t>10/16/2016</a:t>
+              <a:t>17-04-09</a:t>
             </a:fld>
             <a:endParaRPr lang="en-US"/>
           </a:p>
@@ -1161,7 +1161,7 @@
           <a:p>
             <a:fld id="{78C97017-6FC3-485B-9764-EAC9E56C1D49}" type="datetimeFigureOut">
               <a:rPr lang="en-US" smtClean="0"/>
-              <a:t>10/16/2016</a:t>
+              <a:t>17-04-09</a:t>
             </a:fld>
             <a:endParaRPr lang="en-US"/>
           </a:p>
@@ -1407,7 +1407,7 @@
           <a:p>
             <a:fld id="{78C97017-6FC3-485B-9764-EAC9E56C1D49}" type="datetimeFigureOut">
               <a:rPr lang="en-US" smtClean="0"/>
-              <a:t>10/16/2016</a:t>
+              <a:t>17-04-09</a:t>
             </a:fld>
             <a:endParaRPr lang="en-US"/>
           </a:p>
@@ -1695,7 +1695,7 @@
           <a:p>
             <a:fld id="{78C97017-6FC3-485B-9764-EAC9E56C1D49}" type="datetimeFigureOut">
               <a:rPr lang="en-US" smtClean="0"/>
-              <a:t>10/16/2016</a:t>
+              <a:t>17-04-09</a:t>
             </a:fld>
             <a:endParaRPr lang="en-US"/>
           </a:p>
@@ -2117,7 +2117,7 @@
           <a:p>
             <a:fld id="{78C97017-6FC3-485B-9764-EAC9E56C1D49}" type="datetimeFigureOut">
               <a:rPr lang="en-US" smtClean="0"/>
-              <a:t>10/16/2016</a:t>
+              <a:t>17-04-09</a:t>
             </a:fld>
             <a:endParaRPr lang="en-US"/>
           </a:p>
@@ -2235,7 +2235,7 @@
           <a:p>
             <a:fld id="{78C97017-6FC3-485B-9764-EAC9E56C1D49}" type="datetimeFigureOut">
               <a:rPr lang="en-US" smtClean="0"/>
-              <a:t>10/16/2016</a:t>
+              <a:t>17-04-09</a:t>
             </a:fld>
             <a:endParaRPr lang="en-US"/>
           </a:p>
@@ -2330,7 +2330,7 @@
           <a:p>
             <a:fld id="{78C97017-6FC3-485B-9764-EAC9E56C1D49}" type="datetimeFigureOut">
               <a:rPr lang="en-US" smtClean="0"/>
-              <a:t>10/16/2016</a:t>
+              <a:t>17-04-09</a:t>
             </a:fld>
             <a:endParaRPr lang="en-US"/>
           </a:p>
@@ -2607,7 +2607,7 @@
           <a:p>
             <a:fld id="{78C97017-6FC3-485B-9764-EAC9E56C1D49}" type="datetimeFigureOut">
               <a:rPr lang="en-US" smtClean="0"/>
-              <a:t>10/16/2016</a:t>
+              <a:t>17-04-09</a:t>
             </a:fld>
             <a:endParaRPr lang="en-US"/>
           </a:p>
@@ -2860,7 +2860,7 @@
           <a:p>
             <a:fld id="{78C97017-6FC3-485B-9764-EAC9E56C1D49}" type="datetimeFigureOut">
               <a:rPr lang="en-US" smtClean="0"/>
-              <a:t>10/16/2016</a:t>
+              <a:t>17-04-09</a:t>
             </a:fld>
             <a:endParaRPr lang="en-US"/>
           </a:p>
@@ -3073,7 +3073,7 @@
           <a:p>
             <a:fld id="{78C97017-6FC3-485B-9764-EAC9E56C1D49}" type="datetimeFigureOut">
               <a:rPr lang="en-US" smtClean="0"/>
-              <a:t>10/16/2016</a:t>
+              <a:t>17-04-09</a:t>
             </a:fld>
             <a:endParaRPr lang="en-US"/>
           </a:p>
@@ -3581,7 +3581,15 @@
                   <a:schemeClr val="bg1"/>
                 </a:solidFill>
               </a:rPr>
-              <a:t>AddressBookStorage</a:t>
+              <a:t>TaskList</a:t>
+            </a:r>
+            <a:r>
+              <a:rPr lang="en-US" sz="1050" dirty="0" err="1" smtClean="0">
+                <a:solidFill>
+                  <a:schemeClr val="bg1"/>
+                </a:solidFill>
+              </a:rPr>
+              <a:t>Storage</a:t>
             </a:r>
             <a:endParaRPr lang="en-SG" sz="1050" dirty="0">
               <a:solidFill>
@@ -4154,7 +4162,7 @@
                   </a:schemeClr>
                 </a:solidFill>
               </a:rPr>
-              <a:t>XmlAddressBook</a:t>
+              <a:t>XmlTaskList</a:t>
             </a:r>
             <a:r>
               <a:rPr lang="en-US" sz="1050" b="1" dirty="0" smtClean="0">
@@ -4627,7 +4635,7 @@
                   </a:schemeClr>
                 </a:solidFill>
               </a:rPr>
-              <a:t>AddressBook</a:t>
+              <a:t>TaskList</a:t>
             </a:r>
             <a:endParaRPr lang="en-SG" sz="1050" b="1" dirty="0">
               <a:solidFill>
@@ -4780,7 +4788,7 @@
                   </a:schemeClr>
                 </a:solidFill>
               </a:rPr>
-              <a:t>XmlAdaptedPerson</a:t>
+              <a:t>XmlAdaptedTask</a:t>
             </a:r>
             <a:endParaRPr lang="en-SG" sz="1050" b="1" dirty="0">
               <a:solidFill>
@@ -4846,7 +4854,7 @@
   <p:timing>
     <p:tnLst>
       <p:par>
-        <p:cTn id="1" dur="indefinite" restart="never" nodeType="tmRoot"/>
+        <p:cTn xmlns:p14="http://schemas.microsoft.com/office/powerpoint/2010/main" id="1" dur="indefinite" restart="never" nodeType="tmRoot"/>
       </p:par>
     </p:tnLst>
   </p:timing>

</xml_diff>